<commit_message>
added information specific to Lab #3
</commit_message>
<xml_diff>
--- a/cs447jb_rec2_feb2_and_feb5.pptx
+++ b/cs447jb_rec2_feb2_and_feb5.pptx
@@ -5,7 +5,7 @@
     <p:sldMasterId id="2147483660" r:id="rId1"/>
   </p:sldMasterIdLst>
   <p:notesMasterIdLst>
-    <p:notesMasterId r:id="rId9"/>
+    <p:notesMasterId r:id="rId20"/>
   </p:notesMasterIdLst>
   <p:sldIdLst>
     <p:sldId id="258" r:id="rId2"/>
@@ -15,6 +15,17 @@
     <p:sldId id="286" r:id="rId6"/>
     <p:sldId id="287" r:id="rId7"/>
     <p:sldId id="288" r:id="rId8"/>
+    <p:sldId id="289" r:id="rId9"/>
+    <p:sldId id="302" r:id="rId10"/>
+    <p:sldId id="291" r:id="rId11"/>
+    <p:sldId id="292" r:id="rId12"/>
+    <p:sldId id="293" r:id="rId13"/>
+    <p:sldId id="294" r:id="rId14"/>
+    <p:sldId id="296" r:id="rId15"/>
+    <p:sldId id="297" r:id="rId16"/>
+    <p:sldId id="299" r:id="rId17"/>
+    <p:sldId id="300" r:id="rId18"/>
+    <p:sldId id="301" r:id="rId19"/>
   </p:sldIdLst>
   <p:sldSz cx="9144000" cy="6858000" type="screen4x3"/>
   <p:notesSz cx="6858000" cy="9144000"/>
@@ -144,6 +155,10 @@
 </p:cmAuthorLst>
 </file>
 
+<file path=ppt/revisionInfo.xml><?xml version="1.0" encoding="utf-8"?>
+<p1510:revInfo xmlns:a="http://schemas.openxmlformats.org/drawingml/2006/main" xmlns:r="http://schemas.openxmlformats.org/officeDocument/2006/relationships" xmlns:p1510="http://schemas.microsoft.com/office/powerpoint/2015/10/main"/>
+</file>
+
 <file path=ppt/notesMasters/notesMaster1.xml><?xml version="1.0" encoding="utf-8"?>
 <p:notesMaster xmlns:a="http://schemas.openxmlformats.org/drawingml/2006/main" xmlns:r="http://schemas.openxmlformats.org/officeDocument/2006/relationships" xmlns:p="http://schemas.openxmlformats.org/presentationml/2006/main">
   <p:cSld>
@@ -226,7 +241,7 @@
           <a:p>
             <a:fld id="{79DACF82-7282-4538-9925-81D795D18BF0}" type="datetimeFigureOut">
               <a:rPr lang="en-US" smtClean="0"/>
-              <a:t>2/1/2018</a:t>
+              <a:t>2/2/2018</a:t>
             </a:fld>
             <a:endParaRPr lang="en-US"/>
           </a:p>
@@ -493,6 +508,930 @@
 </p:notesMaster>
 </file>
 
+<file path=ppt/notesSlides/notesSlide1.xml><?xml version="1.0" encoding="utf-8"?>
+<p:notes xmlns:a="http://schemas.openxmlformats.org/drawingml/2006/main" xmlns:r="http://schemas.openxmlformats.org/officeDocument/2006/relationships" xmlns:p="http://schemas.openxmlformats.org/presentationml/2006/main">
+  <p:cSld>
+    <p:spTree>
+      <p:nvGrpSpPr>
+        <p:cNvPr id="1" name=""/>
+        <p:cNvGrpSpPr/>
+        <p:nvPr/>
+      </p:nvGrpSpPr>
+      <p:grpSpPr>
+        <a:xfrm>
+          <a:off x="0" y="0"/>
+          <a:ext cx="0" cy="0"/>
+          <a:chOff x="0" y="0"/>
+          <a:chExt cx="0" cy="0"/>
+        </a:xfrm>
+      </p:grpSpPr>
+      <p:sp>
+        <p:nvSpPr>
+          <p:cNvPr id="2" name="Slide Image Placeholder 1"/>
+          <p:cNvSpPr>
+            <a:spLocks noGrp="1" noRot="1" noChangeAspect="1"/>
+          </p:cNvSpPr>
+          <p:nvPr>
+            <p:ph type="sldImg"/>
+          </p:nvPr>
+        </p:nvSpPr>
+        <p:spPr/>
+      </p:sp>
+      <p:sp>
+        <p:nvSpPr>
+          <p:cNvPr id="3" name="Notes Placeholder 2"/>
+          <p:cNvSpPr>
+            <a:spLocks noGrp="1"/>
+          </p:cNvSpPr>
+          <p:nvPr>
+            <p:ph type="body" idx="1"/>
+          </p:nvPr>
+        </p:nvSpPr>
+        <p:spPr/>
+        <p:txBody>
+          <a:bodyPr/>
+          <a:lstStyle/>
+          <a:p>
+            <a:endParaRPr lang="en-US" dirty="0"/>
+          </a:p>
+        </p:txBody>
+      </p:sp>
+      <p:sp>
+        <p:nvSpPr>
+          <p:cNvPr id="4" name="Slide Number Placeholder 3"/>
+          <p:cNvSpPr>
+            <a:spLocks noGrp="1"/>
+          </p:cNvSpPr>
+          <p:nvPr>
+            <p:ph type="sldNum" sz="quarter" idx="10"/>
+          </p:nvPr>
+        </p:nvSpPr>
+        <p:spPr/>
+        <p:txBody>
+          <a:bodyPr/>
+          <a:lstStyle/>
+          <a:p>
+            <a:fld id="{EFAF9F6D-6F5B-4492-B20A-F0EFDC100956}" type="slidenum">
+              <a:rPr lang="en-US" smtClean="0"/>
+              <a:t>8</a:t>
+            </a:fld>
+            <a:endParaRPr lang="en-US"/>
+          </a:p>
+        </p:txBody>
+      </p:sp>
+    </p:spTree>
+    <p:extLst>
+      <p:ext uri="{BB962C8B-B14F-4D97-AF65-F5344CB8AC3E}">
+        <p14:creationId xmlns:p14="http://schemas.microsoft.com/office/powerpoint/2010/main" val="598139136"/>
+      </p:ext>
+    </p:extLst>
+  </p:cSld>
+  <p:clrMapOvr>
+    <a:masterClrMapping/>
+  </p:clrMapOvr>
+</p:notes>
+</file>
+
+<file path=ppt/notesSlides/notesSlide10.xml><?xml version="1.0" encoding="utf-8"?>
+<p:notes xmlns:a="http://schemas.openxmlformats.org/drawingml/2006/main" xmlns:r="http://schemas.openxmlformats.org/officeDocument/2006/relationships" xmlns:p="http://schemas.openxmlformats.org/presentationml/2006/main">
+  <p:cSld>
+    <p:spTree>
+      <p:nvGrpSpPr>
+        <p:cNvPr id="1" name=""/>
+        <p:cNvGrpSpPr/>
+        <p:nvPr/>
+      </p:nvGrpSpPr>
+      <p:grpSpPr>
+        <a:xfrm>
+          <a:off x="0" y="0"/>
+          <a:ext cx="0" cy="0"/>
+          <a:chOff x="0" y="0"/>
+          <a:chExt cx="0" cy="0"/>
+        </a:xfrm>
+      </p:grpSpPr>
+      <p:sp>
+        <p:nvSpPr>
+          <p:cNvPr id="2" name="Slide Image Placeholder 1"/>
+          <p:cNvSpPr>
+            <a:spLocks noGrp="1" noRot="1" noChangeAspect="1"/>
+          </p:cNvSpPr>
+          <p:nvPr>
+            <p:ph type="sldImg"/>
+          </p:nvPr>
+        </p:nvSpPr>
+        <p:spPr/>
+      </p:sp>
+      <p:sp>
+        <p:nvSpPr>
+          <p:cNvPr id="3" name="Notes Placeholder 2"/>
+          <p:cNvSpPr>
+            <a:spLocks noGrp="1"/>
+          </p:cNvSpPr>
+          <p:nvPr>
+            <p:ph type="body" idx="1"/>
+          </p:nvPr>
+        </p:nvSpPr>
+        <p:spPr/>
+        <p:txBody>
+          <a:bodyPr/>
+          <a:lstStyle/>
+          <a:p>
+            <a:endParaRPr lang="en-US" dirty="0"/>
+          </a:p>
+        </p:txBody>
+      </p:sp>
+      <p:sp>
+        <p:nvSpPr>
+          <p:cNvPr id="4" name="Slide Number Placeholder 3"/>
+          <p:cNvSpPr>
+            <a:spLocks noGrp="1"/>
+          </p:cNvSpPr>
+          <p:nvPr>
+            <p:ph type="sldNum" sz="quarter" idx="10"/>
+          </p:nvPr>
+        </p:nvSpPr>
+        <p:spPr/>
+        <p:txBody>
+          <a:bodyPr/>
+          <a:lstStyle/>
+          <a:p>
+            <a:fld id="{EFAF9F6D-6F5B-4492-B20A-F0EFDC100956}" type="slidenum">
+              <a:rPr lang="en-US" smtClean="0"/>
+              <a:t>17</a:t>
+            </a:fld>
+            <a:endParaRPr lang="en-US"/>
+          </a:p>
+        </p:txBody>
+      </p:sp>
+    </p:spTree>
+    <p:extLst>
+      <p:ext uri="{BB962C8B-B14F-4D97-AF65-F5344CB8AC3E}">
+        <p14:creationId xmlns:p14="http://schemas.microsoft.com/office/powerpoint/2010/main" val="197301032"/>
+      </p:ext>
+    </p:extLst>
+  </p:cSld>
+  <p:clrMapOvr>
+    <a:masterClrMapping/>
+  </p:clrMapOvr>
+</p:notes>
+</file>
+
+<file path=ppt/notesSlides/notesSlide11.xml><?xml version="1.0" encoding="utf-8"?>
+<p:notes xmlns:a="http://schemas.openxmlformats.org/drawingml/2006/main" xmlns:r="http://schemas.openxmlformats.org/officeDocument/2006/relationships" xmlns:p="http://schemas.openxmlformats.org/presentationml/2006/main">
+  <p:cSld>
+    <p:spTree>
+      <p:nvGrpSpPr>
+        <p:cNvPr id="1" name=""/>
+        <p:cNvGrpSpPr/>
+        <p:nvPr/>
+      </p:nvGrpSpPr>
+      <p:grpSpPr>
+        <a:xfrm>
+          <a:off x="0" y="0"/>
+          <a:ext cx="0" cy="0"/>
+          <a:chOff x="0" y="0"/>
+          <a:chExt cx="0" cy="0"/>
+        </a:xfrm>
+      </p:grpSpPr>
+      <p:sp>
+        <p:nvSpPr>
+          <p:cNvPr id="2" name="Slide Image Placeholder 1"/>
+          <p:cNvSpPr>
+            <a:spLocks noGrp="1" noRot="1" noChangeAspect="1"/>
+          </p:cNvSpPr>
+          <p:nvPr>
+            <p:ph type="sldImg"/>
+          </p:nvPr>
+        </p:nvSpPr>
+        <p:spPr/>
+      </p:sp>
+      <p:sp>
+        <p:nvSpPr>
+          <p:cNvPr id="3" name="Notes Placeholder 2"/>
+          <p:cNvSpPr>
+            <a:spLocks noGrp="1"/>
+          </p:cNvSpPr>
+          <p:nvPr>
+            <p:ph type="body" idx="1"/>
+          </p:nvPr>
+        </p:nvSpPr>
+        <p:spPr/>
+        <p:txBody>
+          <a:bodyPr/>
+          <a:lstStyle/>
+          <a:p>
+            <a:endParaRPr lang="en-US" dirty="0"/>
+          </a:p>
+        </p:txBody>
+      </p:sp>
+      <p:sp>
+        <p:nvSpPr>
+          <p:cNvPr id="4" name="Slide Number Placeholder 3"/>
+          <p:cNvSpPr>
+            <a:spLocks noGrp="1"/>
+          </p:cNvSpPr>
+          <p:nvPr>
+            <p:ph type="sldNum" sz="quarter" idx="10"/>
+          </p:nvPr>
+        </p:nvSpPr>
+        <p:spPr/>
+        <p:txBody>
+          <a:bodyPr/>
+          <a:lstStyle/>
+          <a:p>
+            <a:fld id="{EFAF9F6D-6F5B-4492-B20A-F0EFDC100956}" type="slidenum">
+              <a:rPr lang="en-US" smtClean="0"/>
+              <a:t>18</a:t>
+            </a:fld>
+            <a:endParaRPr lang="en-US"/>
+          </a:p>
+        </p:txBody>
+      </p:sp>
+    </p:spTree>
+    <p:extLst>
+      <p:ext uri="{BB962C8B-B14F-4D97-AF65-F5344CB8AC3E}">
+        <p14:creationId xmlns:p14="http://schemas.microsoft.com/office/powerpoint/2010/main" val="3788442444"/>
+      </p:ext>
+    </p:extLst>
+  </p:cSld>
+  <p:clrMapOvr>
+    <a:masterClrMapping/>
+  </p:clrMapOvr>
+</p:notes>
+</file>
+
+<file path=ppt/notesSlides/notesSlide2.xml><?xml version="1.0" encoding="utf-8"?>
+<p:notes xmlns:a="http://schemas.openxmlformats.org/drawingml/2006/main" xmlns:r="http://schemas.openxmlformats.org/officeDocument/2006/relationships" xmlns:p="http://schemas.openxmlformats.org/presentationml/2006/main">
+  <p:cSld>
+    <p:spTree>
+      <p:nvGrpSpPr>
+        <p:cNvPr id="1" name=""/>
+        <p:cNvGrpSpPr/>
+        <p:nvPr/>
+      </p:nvGrpSpPr>
+      <p:grpSpPr>
+        <a:xfrm>
+          <a:off x="0" y="0"/>
+          <a:ext cx="0" cy="0"/>
+          <a:chOff x="0" y="0"/>
+          <a:chExt cx="0" cy="0"/>
+        </a:xfrm>
+      </p:grpSpPr>
+      <p:sp>
+        <p:nvSpPr>
+          <p:cNvPr id="2" name="Slide Image Placeholder 1"/>
+          <p:cNvSpPr>
+            <a:spLocks noGrp="1" noRot="1" noChangeAspect="1"/>
+          </p:cNvSpPr>
+          <p:nvPr>
+            <p:ph type="sldImg"/>
+          </p:nvPr>
+        </p:nvSpPr>
+        <p:spPr/>
+      </p:sp>
+      <p:sp>
+        <p:nvSpPr>
+          <p:cNvPr id="3" name="Notes Placeholder 2"/>
+          <p:cNvSpPr>
+            <a:spLocks noGrp="1"/>
+          </p:cNvSpPr>
+          <p:nvPr>
+            <p:ph type="body" idx="1"/>
+          </p:nvPr>
+        </p:nvSpPr>
+        <p:spPr/>
+        <p:txBody>
+          <a:bodyPr/>
+          <a:lstStyle/>
+          <a:p>
+            <a:endParaRPr lang="en-US" dirty="0"/>
+          </a:p>
+        </p:txBody>
+      </p:sp>
+      <p:sp>
+        <p:nvSpPr>
+          <p:cNvPr id="4" name="Slide Number Placeholder 3"/>
+          <p:cNvSpPr>
+            <a:spLocks noGrp="1"/>
+          </p:cNvSpPr>
+          <p:nvPr>
+            <p:ph type="sldNum" sz="quarter" idx="10"/>
+          </p:nvPr>
+        </p:nvSpPr>
+        <p:spPr/>
+        <p:txBody>
+          <a:bodyPr/>
+          <a:lstStyle/>
+          <a:p>
+            <a:fld id="{EFAF9F6D-6F5B-4492-B20A-F0EFDC100956}" type="slidenum">
+              <a:rPr lang="en-US" smtClean="0"/>
+              <a:t>9</a:t>
+            </a:fld>
+            <a:endParaRPr lang="en-US"/>
+          </a:p>
+        </p:txBody>
+      </p:sp>
+    </p:spTree>
+    <p:extLst>
+      <p:ext uri="{BB962C8B-B14F-4D97-AF65-F5344CB8AC3E}">
+        <p14:creationId xmlns:p14="http://schemas.microsoft.com/office/powerpoint/2010/main" val="996687061"/>
+      </p:ext>
+    </p:extLst>
+  </p:cSld>
+  <p:clrMapOvr>
+    <a:masterClrMapping/>
+  </p:clrMapOvr>
+</p:notes>
+</file>
+
+<file path=ppt/notesSlides/notesSlide3.xml><?xml version="1.0" encoding="utf-8"?>
+<p:notes xmlns:a="http://schemas.openxmlformats.org/drawingml/2006/main" xmlns:r="http://schemas.openxmlformats.org/officeDocument/2006/relationships" xmlns:p="http://schemas.openxmlformats.org/presentationml/2006/main">
+  <p:cSld>
+    <p:spTree>
+      <p:nvGrpSpPr>
+        <p:cNvPr id="1" name=""/>
+        <p:cNvGrpSpPr/>
+        <p:nvPr/>
+      </p:nvGrpSpPr>
+      <p:grpSpPr>
+        <a:xfrm>
+          <a:off x="0" y="0"/>
+          <a:ext cx="0" cy="0"/>
+          <a:chOff x="0" y="0"/>
+          <a:chExt cx="0" cy="0"/>
+        </a:xfrm>
+      </p:grpSpPr>
+      <p:sp>
+        <p:nvSpPr>
+          <p:cNvPr id="2" name="Slide Image Placeholder 1"/>
+          <p:cNvSpPr>
+            <a:spLocks noGrp="1" noRot="1" noChangeAspect="1"/>
+          </p:cNvSpPr>
+          <p:nvPr>
+            <p:ph type="sldImg"/>
+          </p:nvPr>
+        </p:nvSpPr>
+        <p:spPr/>
+      </p:sp>
+      <p:sp>
+        <p:nvSpPr>
+          <p:cNvPr id="3" name="Notes Placeholder 2"/>
+          <p:cNvSpPr>
+            <a:spLocks noGrp="1"/>
+          </p:cNvSpPr>
+          <p:nvPr>
+            <p:ph type="body" idx="1"/>
+          </p:nvPr>
+        </p:nvSpPr>
+        <p:spPr/>
+        <p:txBody>
+          <a:bodyPr/>
+          <a:lstStyle/>
+          <a:p>
+            <a:endParaRPr lang="en-US" dirty="0"/>
+          </a:p>
+        </p:txBody>
+      </p:sp>
+      <p:sp>
+        <p:nvSpPr>
+          <p:cNvPr id="4" name="Slide Number Placeholder 3"/>
+          <p:cNvSpPr>
+            <a:spLocks noGrp="1"/>
+          </p:cNvSpPr>
+          <p:nvPr>
+            <p:ph type="sldNum" sz="quarter" idx="10"/>
+          </p:nvPr>
+        </p:nvSpPr>
+        <p:spPr/>
+        <p:txBody>
+          <a:bodyPr/>
+          <a:lstStyle/>
+          <a:p>
+            <a:fld id="{EFAF9F6D-6F5B-4492-B20A-F0EFDC100956}" type="slidenum">
+              <a:rPr lang="en-US" smtClean="0"/>
+              <a:t>10</a:t>
+            </a:fld>
+            <a:endParaRPr lang="en-US"/>
+          </a:p>
+        </p:txBody>
+      </p:sp>
+    </p:spTree>
+    <p:extLst>
+      <p:ext uri="{BB962C8B-B14F-4D97-AF65-F5344CB8AC3E}">
+        <p14:creationId xmlns:p14="http://schemas.microsoft.com/office/powerpoint/2010/main" val="3190591253"/>
+      </p:ext>
+    </p:extLst>
+  </p:cSld>
+  <p:clrMapOvr>
+    <a:masterClrMapping/>
+  </p:clrMapOvr>
+</p:notes>
+</file>
+
+<file path=ppt/notesSlides/notesSlide4.xml><?xml version="1.0" encoding="utf-8"?>
+<p:notes xmlns:a="http://schemas.openxmlformats.org/drawingml/2006/main" xmlns:r="http://schemas.openxmlformats.org/officeDocument/2006/relationships" xmlns:p="http://schemas.openxmlformats.org/presentationml/2006/main">
+  <p:cSld>
+    <p:spTree>
+      <p:nvGrpSpPr>
+        <p:cNvPr id="1" name=""/>
+        <p:cNvGrpSpPr/>
+        <p:nvPr/>
+      </p:nvGrpSpPr>
+      <p:grpSpPr>
+        <a:xfrm>
+          <a:off x="0" y="0"/>
+          <a:ext cx="0" cy="0"/>
+          <a:chOff x="0" y="0"/>
+          <a:chExt cx="0" cy="0"/>
+        </a:xfrm>
+      </p:grpSpPr>
+      <p:sp>
+        <p:nvSpPr>
+          <p:cNvPr id="2" name="Slide Image Placeholder 1"/>
+          <p:cNvSpPr>
+            <a:spLocks noGrp="1" noRot="1" noChangeAspect="1"/>
+          </p:cNvSpPr>
+          <p:nvPr>
+            <p:ph type="sldImg"/>
+          </p:nvPr>
+        </p:nvSpPr>
+        <p:spPr/>
+      </p:sp>
+      <p:sp>
+        <p:nvSpPr>
+          <p:cNvPr id="3" name="Notes Placeholder 2"/>
+          <p:cNvSpPr>
+            <a:spLocks noGrp="1"/>
+          </p:cNvSpPr>
+          <p:nvPr>
+            <p:ph type="body" idx="1"/>
+          </p:nvPr>
+        </p:nvSpPr>
+        <p:spPr/>
+        <p:txBody>
+          <a:bodyPr/>
+          <a:lstStyle/>
+          <a:p>
+            <a:endParaRPr lang="en-US" dirty="0"/>
+          </a:p>
+        </p:txBody>
+      </p:sp>
+      <p:sp>
+        <p:nvSpPr>
+          <p:cNvPr id="4" name="Slide Number Placeholder 3"/>
+          <p:cNvSpPr>
+            <a:spLocks noGrp="1"/>
+          </p:cNvSpPr>
+          <p:nvPr>
+            <p:ph type="sldNum" sz="quarter" idx="10"/>
+          </p:nvPr>
+        </p:nvSpPr>
+        <p:spPr/>
+        <p:txBody>
+          <a:bodyPr/>
+          <a:lstStyle/>
+          <a:p>
+            <a:fld id="{EFAF9F6D-6F5B-4492-B20A-F0EFDC100956}" type="slidenum">
+              <a:rPr lang="en-US" smtClean="0"/>
+              <a:t>11</a:t>
+            </a:fld>
+            <a:endParaRPr lang="en-US"/>
+          </a:p>
+        </p:txBody>
+      </p:sp>
+    </p:spTree>
+    <p:extLst>
+      <p:ext uri="{BB962C8B-B14F-4D97-AF65-F5344CB8AC3E}">
+        <p14:creationId xmlns:p14="http://schemas.microsoft.com/office/powerpoint/2010/main" val="3093892743"/>
+      </p:ext>
+    </p:extLst>
+  </p:cSld>
+  <p:clrMapOvr>
+    <a:masterClrMapping/>
+  </p:clrMapOvr>
+</p:notes>
+</file>
+
+<file path=ppt/notesSlides/notesSlide5.xml><?xml version="1.0" encoding="utf-8"?>
+<p:notes xmlns:a="http://schemas.openxmlformats.org/drawingml/2006/main" xmlns:r="http://schemas.openxmlformats.org/officeDocument/2006/relationships" xmlns:p="http://schemas.openxmlformats.org/presentationml/2006/main">
+  <p:cSld>
+    <p:spTree>
+      <p:nvGrpSpPr>
+        <p:cNvPr id="1" name=""/>
+        <p:cNvGrpSpPr/>
+        <p:nvPr/>
+      </p:nvGrpSpPr>
+      <p:grpSpPr>
+        <a:xfrm>
+          <a:off x="0" y="0"/>
+          <a:ext cx="0" cy="0"/>
+          <a:chOff x="0" y="0"/>
+          <a:chExt cx="0" cy="0"/>
+        </a:xfrm>
+      </p:grpSpPr>
+      <p:sp>
+        <p:nvSpPr>
+          <p:cNvPr id="2" name="Slide Image Placeholder 1"/>
+          <p:cNvSpPr>
+            <a:spLocks noGrp="1" noRot="1" noChangeAspect="1"/>
+          </p:cNvSpPr>
+          <p:nvPr>
+            <p:ph type="sldImg"/>
+          </p:nvPr>
+        </p:nvSpPr>
+        <p:spPr/>
+      </p:sp>
+      <p:sp>
+        <p:nvSpPr>
+          <p:cNvPr id="3" name="Notes Placeholder 2"/>
+          <p:cNvSpPr>
+            <a:spLocks noGrp="1"/>
+          </p:cNvSpPr>
+          <p:nvPr>
+            <p:ph type="body" idx="1"/>
+          </p:nvPr>
+        </p:nvSpPr>
+        <p:spPr/>
+        <p:txBody>
+          <a:bodyPr/>
+          <a:lstStyle/>
+          <a:p>
+            <a:endParaRPr lang="en-US" dirty="0"/>
+          </a:p>
+        </p:txBody>
+      </p:sp>
+      <p:sp>
+        <p:nvSpPr>
+          <p:cNvPr id="4" name="Slide Number Placeholder 3"/>
+          <p:cNvSpPr>
+            <a:spLocks noGrp="1"/>
+          </p:cNvSpPr>
+          <p:nvPr>
+            <p:ph type="sldNum" sz="quarter" idx="10"/>
+          </p:nvPr>
+        </p:nvSpPr>
+        <p:spPr/>
+        <p:txBody>
+          <a:bodyPr/>
+          <a:lstStyle/>
+          <a:p>
+            <a:fld id="{EFAF9F6D-6F5B-4492-B20A-F0EFDC100956}" type="slidenum">
+              <a:rPr lang="en-US" smtClean="0"/>
+              <a:t>12</a:t>
+            </a:fld>
+            <a:endParaRPr lang="en-US"/>
+          </a:p>
+        </p:txBody>
+      </p:sp>
+    </p:spTree>
+    <p:extLst>
+      <p:ext uri="{BB962C8B-B14F-4D97-AF65-F5344CB8AC3E}">
+        <p14:creationId xmlns:p14="http://schemas.microsoft.com/office/powerpoint/2010/main" val="2785585195"/>
+      </p:ext>
+    </p:extLst>
+  </p:cSld>
+  <p:clrMapOvr>
+    <a:masterClrMapping/>
+  </p:clrMapOvr>
+</p:notes>
+</file>
+
+<file path=ppt/notesSlides/notesSlide6.xml><?xml version="1.0" encoding="utf-8"?>
+<p:notes xmlns:a="http://schemas.openxmlformats.org/drawingml/2006/main" xmlns:r="http://schemas.openxmlformats.org/officeDocument/2006/relationships" xmlns:p="http://schemas.openxmlformats.org/presentationml/2006/main">
+  <p:cSld>
+    <p:spTree>
+      <p:nvGrpSpPr>
+        <p:cNvPr id="1" name=""/>
+        <p:cNvGrpSpPr/>
+        <p:nvPr/>
+      </p:nvGrpSpPr>
+      <p:grpSpPr>
+        <a:xfrm>
+          <a:off x="0" y="0"/>
+          <a:ext cx="0" cy="0"/>
+          <a:chOff x="0" y="0"/>
+          <a:chExt cx="0" cy="0"/>
+        </a:xfrm>
+      </p:grpSpPr>
+      <p:sp>
+        <p:nvSpPr>
+          <p:cNvPr id="2" name="Slide Image Placeholder 1"/>
+          <p:cNvSpPr>
+            <a:spLocks noGrp="1" noRot="1" noChangeAspect="1"/>
+          </p:cNvSpPr>
+          <p:nvPr>
+            <p:ph type="sldImg"/>
+          </p:nvPr>
+        </p:nvSpPr>
+        <p:spPr/>
+      </p:sp>
+      <p:sp>
+        <p:nvSpPr>
+          <p:cNvPr id="3" name="Notes Placeholder 2"/>
+          <p:cNvSpPr>
+            <a:spLocks noGrp="1"/>
+          </p:cNvSpPr>
+          <p:nvPr>
+            <p:ph type="body" idx="1"/>
+          </p:nvPr>
+        </p:nvSpPr>
+        <p:spPr/>
+        <p:txBody>
+          <a:bodyPr/>
+          <a:lstStyle/>
+          <a:p>
+            <a:endParaRPr lang="en-US" dirty="0"/>
+          </a:p>
+        </p:txBody>
+      </p:sp>
+      <p:sp>
+        <p:nvSpPr>
+          <p:cNvPr id="4" name="Slide Number Placeholder 3"/>
+          <p:cNvSpPr>
+            <a:spLocks noGrp="1"/>
+          </p:cNvSpPr>
+          <p:nvPr>
+            <p:ph type="sldNum" sz="quarter" idx="10"/>
+          </p:nvPr>
+        </p:nvSpPr>
+        <p:spPr/>
+        <p:txBody>
+          <a:bodyPr/>
+          <a:lstStyle/>
+          <a:p>
+            <a:fld id="{EFAF9F6D-6F5B-4492-B20A-F0EFDC100956}" type="slidenum">
+              <a:rPr lang="en-US" smtClean="0"/>
+              <a:t>13</a:t>
+            </a:fld>
+            <a:endParaRPr lang="en-US"/>
+          </a:p>
+        </p:txBody>
+      </p:sp>
+    </p:spTree>
+    <p:extLst>
+      <p:ext uri="{BB962C8B-B14F-4D97-AF65-F5344CB8AC3E}">
+        <p14:creationId xmlns:p14="http://schemas.microsoft.com/office/powerpoint/2010/main" val="642388447"/>
+      </p:ext>
+    </p:extLst>
+  </p:cSld>
+  <p:clrMapOvr>
+    <a:masterClrMapping/>
+  </p:clrMapOvr>
+</p:notes>
+</file>
+
+<file path=ppt/notesSlides/notesSlide7.xml><?xml version="1.0" encoding="utf-8"?>
+<p:notes xmlns:a="http://schemas.openxmlformats.org/drawingml/2006/main" xmlns:r="http://schemas.openxmlformats.org/officeDocument/2006/relationships" xmlns:p="http://schemas.openxmlformats.org/presentationml/2006/main">
+  <p:cSld>
+    <p:spTree>
+      <p:nvGrpSpPr>
+        <p:cNvPr id="1" name=""/>
+        <p:cNvGrpSpPr/>
+        <p:nvPr/>
+      </p:nvGrpSpPr>
+      <p:grpSpPr>
+        <a:xfrm>
+          <a:off x="0" y="0"/>
+          <a:ext cx="0" cy="0"/>
+          <a:chOff x="0" y="0"/>
+          <a:chExt cx="0" cy="0"/>
+        </a:xfrm>
+      </p:grpSpPr>
+      <p:sp>
+        <p:nvSpPr>
+          <p:cNvPr id="2" name="Slide Image Placeholder 1"/>
+          <p:cNvSpPr>
+            <a:spLocks noGrp="1" noRot="1" noChangeAspect="1"/>
+          </p:cNvSpPr>
+          <p:nvPr>
+            <p:ph type="sldImg"/>
+          </p:nvPr>
+        </p:nvSpPr>
+        <p:spPr/>
+      </p:sp>
+      <p:sp>
+        <p:nvSpPr>
+          <p:cNvPr id="3" name="Notes Placeholder 2"/>
+          <p:cNvSpPr>
+            <a:spLocks noGrp="1"/>
+          </p:cNvSpPr>
+          <p:nvPr>
+            <p:ph type="body" idx="1"/>
+          </p:nvPr>
+        </p:nvSpPr>
+        <p:spPr/>
+        <p:txBody>
+          <a:bodyPr/>
+          <a:lstStyle/>
+          <a:p>
+            <a:endParaRPr lang="en-US" dirty="0"/>
+          </a:p>
+        </p:txBody>
+      </p:sp>
+      <p:sp>
+        <p:nvSpPr>
+          <p:cNvPr id="4" name="Slide Number Placeholder 3"/>
+          <p:cNvSpPr>
+            <a:spLocks noGrp="1"/>
+          </p:cNvSpPr>
+          <p:nvPr>
+            <p:ph type="sldNum" sz="quarter" idx="10"/>
+          </p:nvPr>
+        </p:nvSpPr>
+        <p:spPr/>
+        <p:txBody>
+          <a:bodyPr/>
+          <a:lstStyle/>
+          <a:p>
+            <a:fld id="{EFAF9F6D-6F5B-4492-B20A-F0EFDC100956}" type="slidenum">
+              <a:rPr lang="en-US" smtClean="0"/>
+              <a:t>14</a:t>
+            </a:fld>
+            <a:endParaRPr lang="en-US"/>
+          </a:p>
+        </p:txBody>
+      </p:sp>
+    </p:spTree>
+    <p:extLst>
+      <p:ext uri="{BB962C8B-B14F-4D97-AF65-F5344CB8AC3E}">
+        <p14:creationId xmlns:p14="http://schemas.microsoft.com/office/powerpoint/2010/main" val="4145430246"/>
+      </p:ext>
+    </p:extLst>
+  </p:cSld>
+  <p:clrMapOvr>
+    <a:masterClrMapping/>
+  </p:clrMapOvr>
+</p:notes>
+</file>
+
+<file path=ppt/notesSlides/notesSlide8.xml><?xml version="1.0" encoding="utf-8"?>
+<p:notes xmlns:a="http://schemas.openxmlformats.org/drawingml/2006/main" xmlns:r="http://schemas.openxmlformats.org/officeDocument/2006/relationships" xmlns:p="http://schemas.openxmlformats.org/presentationml/2006/main">
+  <p:cSld>
+    <p:spTree>
+      <p:nvGrpSpPr>
+        <p:cNvPr id="1" name=""/>
+        <p:cNvGrpSpPr/>
+        <p:nvPr/>
+      </p:nvGrpSpPr>
+      <p:grpSpPr>
+        <a:xfrm>
+          <a:off x="0" y="0"/>
+          <a:ext cx="0" cy="0"/>
+          <a:chOff x="0" y="0"/>
+          <a:chExt cx="0" cy="0"/>
+        </a:xfrm>
+      </p:grpSpPr>
+      <p:sp>
+        <p:nvSpPr>
+          <p:cNvPr id="2" name="Slide Image Placeholder 1"/>
+          <p:cNvSpPr>
+            <a:spLocks noGrp="1" noRot="1" noChangeAspect="1"/>
+          </p:cNvSpPr>
+          <p:nvPr>
+            <p:ph type="sldImg"/>
+          </p:nvPr>
+        </p:nvSpPr>
+        <p:spPr/>
+      </p:sp>
+      <p:sp>
+        <p:nvSpPr>
+          <p:cNvPr id="3" name="Notes Placeholder 2"/>
+          <p:cNvSpPr>
+            <a:spLocks noGrp="1"/>
+          </p:cNvSpPr>
+          <p:nvPr>
+            <p:ph type="body" idx="1"/>
+          </p:nvPr>
+        </p:nvSpPr>
+        <p:spPr/>
+        <p:txBody>
+          <a:bodyPr/>
+          <a:lstStyle/>
+          <a:p>
+            <a:endParaRPr lang="en-US" dirty="0"/>
+          </a:p>
+        </p:txBody>
+      </p:sp>
+      <p:sp>
+        <p:nvSpPr>
+          <p:cNvPr id="4" name="Slide Number Placeholder 3"/>
+          <p:cNvSpPr>
+            <a:spLocks noGrp="1"/>
+          </p:cNvSpPr>
+          <p:nvPr>
+            <p:ph type="sldNum" sz="quarter" idx="10"/>
+          </p:nvPr>
+        </p:nvSpPr>
+        <p:spPr/>
+        <p:txBody>
+          <a:bodyPr/>
+          <a:lstStyle/>
+          <a:p>
+            <a:fld id="{EFAF9F6D-6F5B-4492-B20A-F0EFDC100956}" type="slidenum">
+              <a:rPr lang="en-US" smtClean="0"/>
+              <a:t>15</a:t>
+            </a:fld>
+            <a:endParaRPr lang="en-US"/>
+          </a:p>
+        </p:txBody>
+      </p:sp>
+    </p:spTree>
+    <p:extLst>
+      <p:ext uri="{BB962C8B-B14F-4D97-AF65-F5344CB8AC3E}">
+        <p14:creationId xmlns:p14="http://schemas.microsoft.com/office/powerpoint/2010/main" val="420203512"/>
+      </p:ext>
+    </p:extLst>
+  </p:cSld>
+  <p:clrMapOvr>
+    <a:masterClrMapping/>
+  </p:clrMapOvr>
+</p:notes>
+</file>
+
+<file path=ppt/notesSlides/notesSlide9.xml><?xml version="1.0" encoding="utf-8"?>
+<p:notes xmlns:a="http://schemas.openxmlformats.org/drawingml/2006/main" xmlns:r="http://schemas.openxmlformats.org/officeDocument/2006/relationships" xmlns:p="http://schemas.openxmlformats.org/presentationml/2006/main">
+  <p:cSld>
+    <p:spTree>
+      <p:nvGrpSpPr>
+        <p:cNvPr id="1" name=""/>
+        <p:cNvGrpSpPr/>
+        <p:nvPr/>
+      </p:nvGrpSpPr>
+      <p:grpSpPr>
+        <a:xfrm>
+          <a:off x="0" y="0"/>
+          <a:ext cx="0" cy="0"/>
+          <a:chOff x="0" y="0"/>
+          <a:chExt cx="0" cy="0"/>
+        </a:xfrm>
+      </p:grpSpPr>
+      <p:sp>
+        <p:nvSpPr>
+          <p:cNvPr id="2" name="Slide Image Placeholder 1"/>
+          <p:cNvSpPr>
+            <a:spLocks noGrp="1" noRot="1" noChangeAspect="1"/>
+          </p:cNvSpPr>
+          <p:nvPr>
+            <p:ph type="sldImg"/>
+          </p:nvPr>
+        </p:nvSpPr>
+        <p:spPr/>
+      </p:sp>
+      <p:sp>
+        <p:nvSpPr>
+          <p:cNvPr id="3" name="Notes Placeholder 2"/>
+          <p:cNvSpPr>
+            <a:spLocks noGrp="1"/>
+          </p:cNvSpPr>
+          <p:nvPr>
+            <p:ph type="body" idx="1"/>
+          </p:nvPr>
+        </p:nvSpPr>
+        <p:spPr/>
+        <p:txBody>
+          <a:bodyPr/>
+          <a:lstStyle/>
+          <a:p>
+            <a:endParaRPr lang="en-US" dirty="0"/>
+          </a:p>
+        </p:txBody>
+      </p:sp>
+      <p:sp>
+        <p:nvSpPr>
+          <p:cNvPr id="4" name="Slide Number Placeholder 3"/>
+          <p:cNvSpPr>
+            <a:spLocks noGrp="1"/>
+          </p:cNvSpPr>
+          <p:nvPr>
+            <p:ph type="sldNum" sz="quarter" idx="10"/>
+          </p:nvPr>
+        </p:nvSpPr>
+        <p:spPr/>
+        <p:txBody>
+          <a:bodyPr/>
+          <a:lstStyle/>
+          <a:p>
+            <a:fld id="{EFAF9F6D-6F5B-4492-B20A-F0EFDC100956}" type="slidenum">
+              <a:rPr lang="en-US" smtClean="0"/>
+              <a:t>16</a:t>
+            </a:fld>
+            <a:endParaRPr lang="en-US"/>
+          </a:p>
+        </p:txBody>
+      </p:sp>
+    </p:spTree>
+    <p:extLst>
+      <p:ext uri="{BB962C8B-B14F-4D97-AF65-F5344CB8AC3E}">
+        <p14:creationId xmlns:p14="http://schemas.microsoft.com/office/powerpoint/2010/main" val="103911764"/>
+      </p:ext>
+    </p:extLst>
+  </p:cSld>
+  <p:clrMapOvr>
+    <a:masterClrMapping/>
+  </p:clrMapOvr>
+</p:notes>
+</file>
+
 <file path=ppt/slideLayouts/slideLayout1.xml><?xml version="1.0" encoding="utf-8"?>
 <p:sldLayout xmlns:a="http://schemas.openxmlformats.org/drawingml/2006/main" xmlns:r="http://schemas.openxmlformats.org/officeDocument/2006/relationships" xmlns:p="http://schemas.openxmlformats.org/presentationml/2006/main" type="title" preserve="1">
   <p:cSld name="Title Slide">
@@ -624,7 +1563,7 @@
           <a:p>
             <a:fld id="{7880F47B-3C72-48E5-9CD2-8B9AE0E9AFF7}" type="datetimeFigureOut">
               <a:rPr lang="en-US" smtClean="0"/>
-              <a:t>2/1/2018</a:t>
+              <a:t>2/2/2018</a:t>
             </a:fld>
             <a:endParaRPr lang="en-US"/>
           </a:p>
@@ -794,7 +1733,7 @@
           <a:p>
             <a:fld id="{7880F47B-3C72-48E5-9CD2-8B9AE0E9AFF7}" type="datetimeFigureOut">
               <a:rPr lang="en-US" smtClean="0"/>
-              <a:t>2/1/2018</a:t>
+              <a:t>2/2/2018</a:t>
             </a:fld>
             <a:endParaRPr lang="en-US"/>
           </a:p>
@@ -974,7 +1913,7 @@
           <a:p>
             <a:fld id="{7880F47B-3C72-48E5-9CD2-8B9AE0E9AFF7}" type="datetimeFigureOut">
               <a:rPr lang="en-US" smtClean="0"/>
-              <a:t>2/1/2018</a:t>
+              <a:t>2/2/2018</a:t>
             </a:fld>
             <a:endParaRPr lang="en-US"/>
           </a:p>
@@ -1144,7 +2083,7 @@
           <a:p>
             <a:fld id="{7880F47B-3C72-48E5-9CD2-8B9AE0E9AFF7}" type="datetimeFigureOut">
               <a:rPr lang="en-US" smtClean="0"/>
-              <a:t>2/1/2018</a:t>
+              <a:t>2/2/2018</a:t>
             </a:fld>
             <a:endParaRPr lang="en-US"/>
           </a:p>
@@ -1388,7 +2327,7 @@
           <a:p>
             <a:fld id="{7880F47B-3C72-48E5-9CD2-8B9AE0E9AFF7}" type="datetimeFigureOut">
               <a:rPr lang="en-US" smtClean="0"/>
-              <a:t>2/1/2018</a:t>
+              <a:t>2/2/2018</a:t>
             </a:fld>
             <a:endParaRPr lang="en-US"/>
           </a:p>
@@ -1620,7 +2559,7 @@
           <a:p>
             <a:fld id="{7880F47B-3C72-48E5-9CD2-8B9AE0E9AFF7}" type="datetimeFigureOut">
               <a:rPr lang="en-US" smtClean="0"/>
-              <a:t>2/1/2018</a:t>
+              <a:t>2/2/2018</a:t>
             </a:fld>
             <a:endParaRPr lang="en-US"/>
           </a:p>
@@ -1987,7 +2926,7 @@
           <a:p>
             <a:fld id="{7880F47B-3C72-48E5-9CD2-8B9AE0E9AFF7}" type="datetimeFigureOut">
               <a:rPr lang="en-US" smtClean="0"/>
-              <a:t>2/1/2018</a:t>
+              <a:t>2/2/2018</a:t>
             </a:fld>
             <a:endParaRPr lang="en-US"/>
           </a:p>
@@ -2105,7 +3044,7 @@
           <a:p>
             <a:fld id="{7880F47B-3C72-48E5-9CD2-8B9AE0E9AFF7}" type="datetimeFigureOut">
               <a:rPr lang="en-US" smtClean="0"/>
-              <a:t>2/1/2018</a:t>
+              <a:t>2/2/2018</a:t>
             </a:fld>
             <a:endParaRPr lang="en-US"/>
           </a:p>
@@ -2200,7 +3139,7 @@
           <a:p>
             <a:fld id="{7880F47B-3C72-48E5-9CD2-8B9AE0E9AFF7}" type="datetimeFigureOut">
               <a:rPr lang="en-US" smtClean="0"/>
-              <a:t>2/1/2018</a:t>
+              <a:t>2/2/2018</a:t>
             </a:fld>
             <a:endParaRPr lang="en-US"/>
           </a:p>
@@ -2477,7 +3416,7 @@
           <a:p>
             <a:fld id="{7880F47B-3C72-48E5-9CD2-8B9AE0E9AFF7}" type="datetimeFigureOut">
               <a:rPr lang="en-US" smtClean="0"/>
-              <a:t>2/1/2018</a:t>
+              <a:t>2/2/2018</a:t>
             </a:fld>
             <a:endParaRPr lang="en-US"/>
           </a:p>
@@ -2734,7 +3673,7 @@
           <a:p>
             <a:fld id="{7880F47B-3C72-48E5-9CD2-8B9AE0E9AFF7}" type="datetimeFigureOut">
               <a:rPr lang="en-US" smtClean="0"/>
-              <a:t>2/1/2018</a:t>
+              <a:t>2/2/2018</a:t>
             </a:fld>
             <a:endParaRPr lang="en-US"/>
           </a:p>
@@ -2947,7 +3886,7 @@
           <a:p>
             <a:fld id="{7880F47B-3C72-48E5-9CD2-8B9AE0E9AFF7}" type="datetimeFigureOut">
               <a:rPr lang="en-US" smtClean="0"/>
-              <a:t>2/1/2018</a:t>
+              <a:t>2/2/2018</a:t>
             </a:fld>
             <a:endParaRPr lang="en-US"/>
           </a:p>
@@ -3379,15 +4318,7 @@
                   <a:srgbClr val="002060"/>
                 </a:solidFill>
               </a:rPr>
-              <a:t>CS447 Recitation #3: 2/2/18 and 2/5/18 </a:t>
-            </a:r>
-            <a:r>
-              <a:rPr lang="en-US" sz="2800" dirty="0">
-                <a:solidFill>
-                  <a:srgbClr val="C00000"/>
-                </a:solidFill>
-              </a:rPr>
-              <a:t>in progress</a:t>
+              <a:t>CS447 Recitation #3: 2/2/18 and 2/5/18</a:t>
             </a:r>
             <a:endParaRPr lang="en-US" sz="2200" dirty="0">
               <a:solidFill>
@@ -3406,7 +4337,7 @@
         <p:spPr>
           <a:xfrm>
             <a:off x="400146" y="1756103"/>
-            <a:ext cx="8201594" cy="2308324"/>
+            <a:ext cx="8201594" cy="2677656"/>
           </a:xfrm>
           <a:prstGeom prst="rect">
             <a:avLst/>
@@ -3452,15 +4383,7 @@
             </a:pPr>
             <a:r>
               <a:rPr lang="en-US" sz="2400" dirty="0"/>
-              <a:t>Make sure </a:t>
-            </a:r>
-            <a:r>
-              <a:rPr lang="en-US" sz="2400"/>
-              <a:t>to download </a:t>
-            </a:r>
-            <a:r>
-              <a:rPr lang="en-US" sz="2400" dirty="0"/>
-              <a:t>the newest Mars version</a:t>
+              <a:t>Make sure to download the newest Mars version</a:t>
             </a:r>
           </a:p>
           <a:p>
@@ -3481,6 +4404,16 @@
             <a:r>
               <a:rPr lang="en-US" sz="2400" dirty="0"/>
               <a:t>Review of function calling conventions (relevant for lab #3)</a:t>
+            </a:r>
+          </a:p>
+          <a:p>
+            <a:pPr marL="457200" indent="-457200">
+              <a:buFont typeface="+mj-lt"/>
+              <a:buAutoNum type="arabicPeriod"/>
+            </a:pPr>
+            <a:r>
+              <a:rPr lang="en-US" sz="2400" dirty="0"/>
+              <a:t>Highlights of lab #3</a:t>
             </a:r>
           </a:p>
           <a:p>
@@ -3541,6 +4474,1990 @@
     <p:extLst>
       <p:ext uri="{BB962C8B-B14F-4D97-AF65-F5344CB8AC3E}">
         <p14:creationId xmlns:p14="http://schemas.microsoft.com/office/powerpoint/2010/main" val="3822045152"/>
+      </p:ext>
+    </p:extLst>
+  </p:cSld>
+  <p:clrMapOvr>
+    <a:masterClrMapping/>
+  </p:clrMapOvr>
+</p:sld>
+</file>
+
+<file path=ppt/slides/slide10.xml><?xml version="1.0" encoding="utf-8"?>
+<p:sld xmlns:a="http://schemas.openxmlformats.org/drawingml/2006/main" xmlns:r="http://schemas.openxmlformats.org/officeDocument/2006/relationships" xmlns:p="http://schemas.openxmlformats.org/presentationml/2006/main">
+  <p:cSld>
+    <p:spTree>
+      <p:nvGrpSpPr>
+        <p:cNvPr id="1" name=""/>
+        <p:cNvGrpSpPr/>
+        <p:nvPr/>
+      </p:nvGrpSpPr>
+      <p:grpSpPr>
+        <a:xfrm>
+          <a:off x="0" y="0"/>
+          <a:ext cx="0" cy="0"/>
+          <a:chOff x="0" y="0"/>
+          <a:chExt cx="0" cy="0"/>
+        </a:xfrm>
+      </p:grpSpPr>
+      <p:sp>
+        <p:nvSpPr>
+          <p:cNvPr id="5" name="TextBox 4"/>
+          <p:cNvSpPr txBox="1"/>
+          <p:nvPr/>
+        </p:nvSpPr>
+        <p:spPr>
+          <a:xfrm>
+            <a:off x="0" y="0"/>
+            <a:ext cx="8134066" cy="523220"/>
+          </a:xfrm>
+          <a:prstGeom prst="rect">
+            <a:avLst/>
+          </a:prstGeom>
+        </p:spPr>
+        <p:txBody>
+          <a:bodyPr rtlCol="0">
+            <a:spAutoFit/>
+          </a:bodyPr>
+          <a:lstStyle/>
+          <a:p>
+            <a:r>
+              <a:rPr lang="en-US" sz="2800" dirty="0">
+                <a:solidFill>
+                  <a:srgbClr val="002060"/>
+                </a:solidFill>
+              </a:rPr>
+              <a:t>Lab #3 highlights</a:t>
+            </a:r>
+          </a:p>
+        </p:txBody>
+      </p:sp>
+      <p:sp>
+        <p:nvSpPr>
+          <p:cNvPr id="12" name="TextBox 11">
+            <a:extLst>
+              <a:ext uri="{FF2B5EF4-FFF2-40B4-BE49-F238E27FC236}">
+                <a16:creationId xmlns:a16="http://schemas.microsoft.com/office/drawing/2014/main" id="{F9342B84-0341-49AB-8F28-450046854806}"/>
+              </a:ext>
+            </a:extLst>
+          </p:cNvPr>
+          <p:cNvSpPr txBox="1"/>
+          <p:nvPr/>
+        </p:nvSpPr>
+        <p:spPr>
+          <a:xfrm>
+            <a:off x="118715" y="523220"/>
+            <a:ext cx="8634760" cy="3477875"/>
+          </a:xfrm>
+          <a:prstGeom prst="rect">
+            <a:avLst/>
+          </a:prstGeom>
+          <a:noFill/>
+        </p:spPr>
+        <p:txBody>
+          <a:bodyPr wrap="square" rtlCol="0">
+            <a:spAutoFit/>
+          </a:bodyPr>
+          <a:lstStyle/>
+          <a:p>
+            <a:r>
+              <a:rPr lang="en-US" sz="2200" u="sng" dirty="0"/>
+              <a:t>Next section</a:t>
+            </a:r>
+            <a:r>
+              <a:rPr lang="en-US" sz="2200" dirty="0"/>
+              <a:t>: Creating an infinite loop with a “sleep” </a:t>
+            </a:r>
+            <a:r>
+              <a:rPr lang="en-US" sz="2200" dirty="0" err="1"/>
+              <a:t>syscall</a:t>
+            </a:r>
+            <a:endParaRPr lang="en-US" sz="2200" dirty="0"/>
+          </a:p>
+          <a:p>
+            <a:endParaRPr lang="en-US" sz="2200" dirty="0"/>
+          </a:p>
+          <a:p>
+            <a:pPr marL="342900" indent="-342900">
+              <a:buFont typeface="Arial" panose="020B0604020202020204" pitchFamily="34" charset="0"/>
+              <a:buChar char="•"/>
+            </a:pPr>
+            <a:r>
+              <a:rPr lang="en-US" sz="2200" dirty="0"/>
+              <a:t>This is </a:t>
+            </a:r>
+            <a:r>
+              <a:rPr lang="en-US" sz="2200" dirty="0" err="1"/>
+              <a:t>syscall</a:t>
+            </a:r>
+            <a:r>
+              <a:rPr lang="en-US" sz="2200" dirty="0"/>
+              <a:t> 32.</a:t>
+            </a:r>
+          </a:p>
+          <a:p>
+            <a:pPr marL="342900" indent="-342900">
+              <a:buFont typeface="Arial" panose="020B0604020202020204" pitchFamily="34" charset="0"/>
+              <a:buChar char="•"/>
+            </a:pPr>
+            <a:endParaRPr lang="en-US" sz="2200" dirty="0"/>
+          </a:p>
+          <a:p>
+            <a:pPr marL="342900" indent="-342900">
+              <a:buFont typeface="Arial" panose="020B0604020202020204" pitchFamily="34" charset="0"/>
+              <a:buChar char="•"/>
+            </a:pPr>
+            <a:r>
+              <a:rPr lang="en-US" sz="2200" dirty="0"/>
+              <a:t>The time to sleep (in milliseconds) will go into register a0.</a:t>
+            </a:r>
+          </a:p>
+          <a:p>
+            <a:pPr marL="800100" lvl="1" indent="-342900">
+              <a:buFont typeface="Arial" panose="020B0604020202020204" pitchFamily="34" charset="0"/>
+              <a:buChar char="•"/>
+            </a:pPr>
+            <a:r>
+              <a:rPr lang="en-US" sz="2200" dirty="0"/>
+              <a:t>a0 will expect an integer.  It is OK to round the # of milliseconds required to approximate the rate of 60 iterations / second.</a:t>
+            </a:r>
+          </a:p>
+          <a:p>
+            <a:pPr lvl="1"/>
+            <a:endParaRPr lang="en-US" sz="2200" dirty="0"/>
+          </a:p>
+          <a:p>
+            <a:endParaRPr lang="en-US" sz="2200" dirty="0"/>
+          </a:p>
+          <a:p>
+            <a:r>
+              <a:rPr lang="en-US" sz="2200" dirty="0"/>
+              <a:t> </a:t>
+            </a:r>
+            <a:endParaRPr lang="en-US" sz="2200" u="sng" dirty="0"/>
+          </a:p>
+        </p:txBody>
+      </p:sp>
+    </p:spTree>
+    <p:extLst>
+      <p:ext uri="{BB962C8B-B14F-4D97-AF65-F5344CB8AC3E}">
+        <p14:creationId xmlns:p14="http://schemas.microsoft.com/office/powerpoint/2010/main" val="269275993"/>
+      </p:ext>
+    </p:extLst>
+  </p:cSld>
+  <p:clrMapOvr>
+    <a:masterClrMapping/>
+  </p:clrMapOvr>
+</p:sld>
+</file>
+
+<file path=ppt/slides/slide11.xml><?xml version="1.0" encoding="utf-8"?>
+<p:sld xmlns:a="http://schemas.openxmlformats.org/drawingml/2006/main" xmlns:r="http://schemas.openxmlformats.org/officeDocument/2006/relationships" xmlns:p="http://schemas.openxmlformats.org/presentationml/2006/main">
+  <p:cSld>
+    <p:spTree>
+      <p:nvGrpSpPr>
+        <p:cNvPr id="1" name=""/>
+        <p:cNvGrpSpPr/>
+        <p:nvPr/>
+      </p:nvGrpSpPr>
+      <p:grpSpPr>
+        <a:xfrm>
+          <a:off x="0" y="0"/>
+          <a:ext cx="0" cy="0"/>
+          <a:chOff x="0" y="0"/>
+          <a:chExt cx="0" cy="0"/>
+        </a:xfrm>
+      </p:grpSpPr>
+      <p:sp>
+        <p:nvSpPr>
+          <p:cNvPr id="5" name="TextBox 4"/>
+          <p:cNvSpPr txBox="1"/>
+          <p:nvPr/>
+        </p:nvSpPr>
+        <p:spPr>
+          <a:xfrm>
+            <a:off x="0" y="0"/>
+            <a:ext cx="8134066" cy="523220"/>
+          </a:xfrm>
+          <a:prstGeom prst="rect">
+            <a:avLst/>
+          </a:prstGeom>
+        </p:spPr>
+        <p:txBody>
+          <a:bodyPr rtlCol="0">
+            <a:spAutoFit/>
+          </a:bodyPr>
+          <a:lstStyle/>
+          <a:p>
+            <a:r>
+              <a:rPr lang="en-US" sz="2800" dirty="0">
+                <a:solidFill>
+                  <a:srgbClr val="002060"/>
+                </a:solidFill>
+              </a:rPr>
+              <a:t>Lab #3 highlights</a:t>
+            </a:r>
+          </a:p>
+        </p:txBody>
+      </p:sp>
+      <p:sp>
+        <p:nvSpPr>
+          <p:cNvPr id="12" name="TextBox 11">
+            <a:extLst>
+              <a:ext uri="{FF2B5EF4-FFF2-40B4-BE49-F238E27FC236}">
+                <a16:creationId xmlns:a16="http://schemas.microsoft.com/office/drawing/2014/main" id="{F9342B84-0341-49AB-8F28-450046854806}"/>
+              </a:ext>
+            </a:extLst>
+          </p:cNvPr>
+          <p:cNvSpPr txBox="1"/>
+          <p:nvPr/>
+        </p:nvSpPr>
+        <p:spPr>
+          <a:xfrm>
+            <a:off x="118715" y="523220"/>
+            <a:ext cx="8634760" cy="5847755"/>
+          </a:xfrm>
+          <a:prstGeom prst="rect">
+            <a:avLst/>
+          </a:prstGeom>
+          <a:noFill/>
+        </p:spPr>
+        <p:txBody>
+          <a:bodyPr wrap="square" rtlCol="0">
+            <a:spAutoFit/>
+          </a:bodyPr>
+          <a:lstStyle/>
+          <a:p>
+            <a:r>
+              <a:rPr lang="en-US" sz="2200" u="sng" dirty="0"/>
+              <a:t>Next section</a:t>
+            </a:r>
+            <a:r>
+              <a:rPr lang="en-US" sz="2200" dirty="0"/>
+              <a:t>: Creating the </a:t>
+            </a:r>
+            <a:r>
+              <a:rPr lang="en-US" sz="2200" dirty="0" err="1">
+                <a:latin typeface="Consolas" panose="020B0609020204030204" pitchFamily="49" charset="0"/>
+                <a:cs typeface="Consolas" panose="020B0609020204030204" pitchFamily="49" charset="0"/>
+              </a:rPr>
+              <a:t>draw_dot</a:t>
+            </a:r>
+            <a:r>
+              <a:rPr lang="en-US" sz="2200" dirty="0"/>
+              <a:t> function to add to the loop</a:t>
+            </a:r>
+          </a:p>
+          <a:p>
+            <a:endParaRPr lang="en-US" sz="2200" dirty="0"/>
+          </a:p>
+          <a:p>
+            <a:pPr marL="457200" indent="-457200">
+              <a:buFont typeface="+mj-lt"/>
+              <a:buAutoNum type="arabicPeriod"/>
+            </a:pPr>
+            <a:r>
+              <a:rPr lang="en-US" sz="2200" dirty="0"/>
+              <a:t>This function largely serves as a wrapper to call the </a:t>
+            </a:r>
+            <a:r>
+              <a:rPr lang="en-US" sz="2200" dirty="0" err="1">
+                <a:latin typeface="Consolas" panose="020B0609020204030204" pitchFamily="49" charset="0"/>
+                <a:cs typeface="Consolas" panose="020B0609020204030204" pitchFamily="49" charset="0"/>
+              </a:rPr>
+              <a:t>display_set_pixel</a:t>
+            </a:r>
+            <a:r>
+              <a:rPr lang="en-US" sz="2200" dirty="0">
+                <a:latin typeface="Consolas" panose="020B0609020204030204" pitchFamily="49" charset="0"/>
+                <a:cs typeface="Consolas" panose="020B0609020204030204" pitchFamily="49" charset="0"/>
+              </a:rPr>
+              <a:t> </a:t>
+            </a:r>
+            <a:r>
+              <a:rPr lang="en-US" sz="2200" dirty="0"/>
+              <a:t>function in </a:t>
+            </a:r>
+            <a:r>
+              <a:rPr lang="en-US" sz="2200" dirty="0">
+                <a:latin typeface="Consolas" panose="020B0609020204030204" pitchFamily="49" charset="0"/>
+                <a:cs typeface="Consolas" panose="020B0609020204030204" pitchFamily="49" charset="0"/>
+              </a:rPr>
+              <a:t>led_keypad.asm</a:t>
+            </a:r>
+            <a:r>
+              <a:rPr lang="en-US" sz="2200" dirty="0"/>
+              <a:t>.</a:t>
+            </a:r>
+          </a:p>
+          <a:p>
+            <a:pPr marL="457200" indent="-457200">
+              <a:buFont typeface="+mj-lt"/>
+              <a:buAutoNum type="arabicPeriod"/>
+            </a:pPr>
+            <a:endParaRPr lang="en-US" sz="2200" dirty="0"/>
+          </a:p>
+          <a:p>
+            <a:pPr marL="457200" indent="-457200">
+              <a:buFont typeface="+mj-lt"/>
+              <a:buAutoNum type="arabicPeriod"/>
+            </a:pPr>
+            <a:r>
+              <a:rPr lang="en-US" sz="2200" dirty="0"/>
+              <a:t>Before calling </a:t>
+            </a:r>
+            <a:r>
+              <a:rPr lang="en-US" sz="2200" dirty="0" err="1">
+                <a:latin typeface="Consolas" panose="020B0609020204030204" pitchFamily="49" charset="0"/>
+                <a:cs typeface="Consolas" panose="020B0609020204030204" pitchFamily="49" charset="0"/>
+              </a:rPr>
+              <a:t>display_set_pixel</a:t>
+            </a:r>
+            <a:r>
+              <a:rPr lang="en-US" sz="2200" dirty="0"/>
+              <a:t>, you will need to set the values of three argument registers (see the comments above the function)</a:t>
+            </a:r>
+          </a:p>
+          <a:p>
+            <a:pPr marL="914400" lvl="1" indent="-457200">
+              <a:buFont typeface="Arial" panose="020B0604020202020204" pitchFamily="34" charset="0"/>
+              <a:buChar char="•"/>
+            </a:pPr>
+            <a:r>
+              <a:rPr lang="en-US" sz="2200" dirty="0"/>
+              <a:t>Remember: </a:t>
+            </a:r>
+          </a:p>
+          <a:p>
+            <a:pPr marL="1371600" lvl="2" indent="-457200">
+              <a:buFont typeface="Arial" panose="020B0604020202020204" pitchFamily="34" charset="0"/>
+              <a:buChar char="•"/>
+            </a:pPr>
+            <a:r>
+              <a:rPr lang="en-US" sz="2200" dirty="0"/>
+              <a:t>Use li (or </a:t>
+            </a:r>
+            <a:r>
+              <a:rPr lang="en-US" sz="2200" dirty="0" err="1"/>
+              <a:t>addi</a:t>
+            </a:r>
+            <a:r>
+              <a:rPr lang="en-US" sz="2200" dirty="0"/>
+              <a:t> in combination with the $zero register) to put an immediate value (i.e., a number supplied on the instruction line) into a register.</a:t>
+            </a:r>
+          </a:p>
+          <a:p>
+            <a:pPr marL="1371600" lvl="2" indent="-457200">
+              <a:buFont typeface="Arial" panose="020B0604020202020204" pitchFamily="34" charset="0"/>
+              <a:buChar char="•"/>
+            </a:pPr>
+            <a:r>
+              <a:rPr lang="en-US" sz="2200" dirty="0"/>
+              <a:t>Use </a:t>
+            </a:r>
+            <a:r>
+              <a:rPr lang="en-US" sz="2200" dirty="0" err="1"/>
+              <a:t>lw</a:t>
+            </a:r>
+            <a:r>
+              <a:rPr lang="en-US" sz="2200" dirty="0"/>
+              <a:t> &lt;register&gt;, &lt;</a:t>
+            </a:r>
+            <a:r>
+              <a:rPr lang="en-US" sz="2200" dirty="0" err="1"/>
+              <a:t>variable_label</a:t>
+            </a:r>
+            <a:r>
+              <a:rPr lang="en-US" sz="2200" dirty="0"/>
+              <a:t>&gt; to place a variable’s value into a register.</a:t>
+            </a:r>
+          </a:p>
+          <a:p>
+            <a:pPr marL="1828800" lvl="3" indent="-457200">
+              <a:buFont typeface="Arial" panose="020B0604020202020204" pitchFamily="34" charset="0"/>
+              <a:buChar char="•"/>
+            </a:pPr>
+            <a:r>
+              <a:rPr lang="en-US" sz="2200" dirty="0"/>
+              <a:t>You don’t need to do go through the load address routine if you’re just loading a single word variable (la is more helpful for arrays).</a:t>
+            </a:r>
+          </a:p>
+          <a:p>
+            <a:r>
+              <a:rPr lang="en-US" sz="2200" dirty="0"/>
+              <a:t> </a:t>
+            </a:r>
+            <a:endParaRPr lang="en-US" sz="2200" u="sng" dirty="0"/>
+          </a:p>
+        </p:txBody>
+      </p:sp>
+    </p:spTree>
+    <p:extLst>
+      <p:ext uri="{BB962C8B-B14F-4D97-AF65-F5344CB8AC3E}">
+        <p14:creationId xmlns:p14="http://schemas.microsoft.com/office/powerpoint/2010/main" val="2447180427"/>
+      </p:ext>
+    </p:extLst>
+  </p:cSld>
+  <p:clrMapOvr>
+    <a:masterClrMapping/>
+  </p:clrMapOvr>
+</p:sld>
+</file>
+
+<file path=ppt/slides/slide12.xml><?xml version="1.0" encoding="utf-8"?>
+<p:sld xmlns:a="http://schemas.openxmlformats.org/drawingml/2006/main" xmlns:r="http://schemas.openxmlformats.org/officeDocument/2006/relationships" xmlns:p="http://schemas.openxmlformats.org/presentationml/2006/main">
+  <p:cSld>
+    <p:spTree>
+      <p:nvGrpSpPr>
+        <p:cNvPr id="1" name=""/>
+        <p:cNvGrpSpPr/>
+        <p:nvPr/>
+      </p:nvGrpSpPr>
+      <p:grpSpPr>
+        <a:xfrm>
+          <a:off x="0" y="0"/>
+          <a:ext cx="0" cy="0"/>
+          <a:chOff x="0" y="0"/>
+          <a:chExt cx="0" cy="0"/>
+        </a:xfrm>
+      </p:grpSpPr>
+      <p:sp>
+        <p:nvSpPr>
+          <p:cNvPr id="5" name="TextBox 4"/>
+          <p:cNvSpPr txBox="1"/>
+          <p:nvPr/>
+        </p:nvSpPr>
+        <p:spPr>
+          <a:xfrm>
+            <a:off x="0" y="0"/>
+            <a:ext cx="8134066" cy="523220"/>
+          </a:xfrm>
+          <a:prstGeom prst="rect">
+            <a:avLst/>
+          </a:prstGeom>
+        </p:spPr>
+        <p:txBody>
+          <a:bodyPr rtlCol="0">
+            <a:spAutoFit/>
+          </a:bodyPr>
+          <a:lstStyle/>
+          <a:p>
+            <a:r>
+              <a:rPr lang="en-US" sz="2800" dirty="0">
+                <a:solidFill>
+                  <a:srgbClr val="002060"/>
+                </a:solidFill>
+              </a:rPr>
+              <a:t>Lab #3 highlights</a:t>
+            </a:r>
+          </a:p>
+        </p:txBody>
+      </p:sp>
+      <p:sp>
+        <p:nvSpPr>
+          <p:cNvPr id="12" name="TextBox 11">
+            <a:extLst>
+              <a:ext uri="{FF2B5EF4-FFF2-40B4-BE49-F238E27FC236}">
+                <a16:creationId xmlns:a16="http://schemas.microsoft.com/office/drawing/2014/main" id="{F9342B84-0341-49AB-8F28-450046854806}"/>
+              </a:ext>
+            </a:extLst>
+          </p:cNvPr>
+          <p:cNvSpPr txBox="1"/>
+          <p:nvPr/>
+        </p:nvSpPr>
+        <p:spPr>
+          <a:xfrm>
+            <a:off x="118715" y="523220"/>
+            <a:ext cx="8634760" cy="3108543"/>
+          </a:xfrm>
+          <a:prstGeom prst="rect">
+            <a:avLst/>
+          </a:prstGeom>
+          <a:noFill/>
+        </p:spPr>
+        <p:txBody>
+          <a:bodyPr wrap="square" rtlCol="0">
+            <a:spAutoFit/>
+          </a:bodyPr>
+          <a:lstStyle/>
+          <a:p>
+            <a:r>
+              <a:rPr lang="en-US" sz="2200" u="sng" dirty="0"/>
+              <a:t>Next section</a:t>
+            </a:r>
+            <a:r>
+              <a:rPr lang="en-US" sz="2200" dirty="0"/>
+              <a:t>: Making the dot appear </a:t>
+            </a:r>
+          </a:p>
+          <a:p>
+            <a:endParaRPr lang="en-US" sz="2200" dirty="0"/>
+          </a:p>
+          <a:p>
+            <a:pPr marL="457200" indent="-457200">
+              <a:buFont typeface="+mj-lt"/>
+              <a:buAutoNum type="arabicPeriod"/>
+            </a:pPr>
+            <a:r>
+              <a:rPr lang="en-US" sz="2200" dirty="0"/>
+              <a:t>In your main loop, call </a:t>
+            </a:r>
+            <a:r>
+              <a:rPr lang="en-US" sz="2200" dirty="0" err="1">
+                <a:latin typeface="Consolas" panose="020B0609020204030204" pitchFamily="49" charset="0"/>
+                <a:cs typeface="Consolas" panose="020B0609020204030204" pitchFamily="49" charset="0"/>
+              </a:rPr>
+              <a:t>draw_dot</a:t>
+            </a:r>
+            <a:endParaRPr lang="en-US" sz="2200" dirty="0">
+              <a:latin typeface="Consolas" panose="020B0609020204030204" pitchFamily="49" charset="0"/>
+              <a:cs typeface="Consolas" panose="020B0609020204030204" pitchFamily="49" charset="0"/>
+            </a:endParaRPr>
+          </a:p>
+          <a:p>
+            <a:pPr marL="914400" lvl="1" indent="-457200">
+              <a:buFont typeface="Arial" panose="020B0604020202020204" pitchFamily="34" charset="0"/>
+              <a:buChar char="•"/>
+            </a:pPr>
+            <a:r>
+              <a:rPr lang="en-US" sz="2000" dirty="0"/>
+              <a:t>This will write data to memory concerning the pixel to draw.</a:t>
+            </a:r>
+          </a:p>
+          <a:p>
+            <a:pPr marL="914400" lvl="1" indent="-457200">
+              <a:buFont typeface="Arial" panose="020B0604020202020204" pitchFamily="34" charset="0"/>
+              <a:buChar char="•"/>
+            </a:pPr>
+            <a:endParaRPr lang="en-US" sz="2200" dirty="0"/>
+          </a:p>
+          <a:p>
+            <a:pPr marL="457200" indent="-457200">
+              <a:buFont typeface="+mj-lt"/>
+              <a:buAutoNum type="arabicPeriod"/>
+            </a:pPr>
+            <a:r>
+              <a:rPr lang="en-US" sz="2200" dirty="0"/>
+              <a:t>After </a:t>
+            </a:r>
+            <a:r>
+              <a:rPr lang="en-US" sz="2200" dirty="0" err="1">
+                <a:latin typeface="Consolas" panose="020B0609020204030204" pitchFamily="49" charset="0"/>
+                <a:cs typeface="Consolas" panose="020B0609020204030204" pitchFamily="49" charset="0"/>
+              </a:rPr>
+              <a:t>draw_dot</a:t>
+            </a:r>
+            <a:r>
+              <a:rPr lang="en-US" sz="2200" dirty="0"/>
+              <a:t>, call </a:t>
+            </a:r>
+            <a:r>
+              <a:rPr lang="en-US" sz="2200" dirty="0" err="1">
+                <a:latin typeface="Consolas" panose="020B0609020204030204" pitchFamily="49" charset="0"/>
+                <a:cs typeface="Consolas" panose="020B0609020204030204" pitchFamily="49" charset="0"/>
+              </a:rPr>
+              <a:t>display_update_and_clear</a:t>
+            </a:r>
+            <a:r>
+              <a:rPr lang="en-US" sz="2200" dirty="0">
+                <a:latin typeface="Consolas" panose="020B0609020204030204" pitchFamily="49" charset="0"/>
+                <a:cs typeface="Consolas" panose="020B0609020204030204" pitchFamily="49" charset="0"/>
+              </a:rPr>
+              <a:t> </a:t>
+            </a:r>
+          </a:p>
+          <a:p>
+            <a:pPr marL="914400" lvl="1" indent="-457200">
+              <a:buFont typeface="Arial" panose="020B0604020202020204" pitchFamily="34" charset="0"/>
+              <a:buChar char="•"/>
+            </a:pPr>
+            <a:r>
+              <a:rPr lang="en-US" sz="2000" dirty="0"/>
+              <a:t>This will implement the changes to the display.</a:t>
+            </a:r>
+          </a:p>
+          <a:p>
+            <a:pPr marL="457200" indent="-457200">
+              <a:buFont typeface="+mj-lt"/>
+              <a:buAutoNum type="arabicPeriod"/>
+            </a:pPr>
+            <a:endParaRPr lang="en-US" sz="2200" dirty="0"/>
+          </a:p>
+          <a:p>
+            <a:r>
+              <a:rPr lang="en-US" sz="2200" dirty="0"/>
+              <a:t> </a:t>
+            </a:r>
+            <a:endParaRPr lang="en-US" sz="2200" u="sng" dirty="0"/>
+          </a:p>
+        </p:txBody>
+      </p:sp>
+    </p:spTree>
+    <p:extLst>
+      <p:ext uri="{BB962C8B-B14F-4D97-AF65-F5344CB8AC3E}">
+        <p14:creationId xmlns:p14="http://schemas.microsoft.com/office/powerpoint/2010/main" val="394252906"/>
+      </p:ext>
+    </p:extLst>
+  </p:cSld>
+  <p:clrMapOvr>
+    <a:masterClrMapping/>
+  </p:clrMapOvr>
+</p:sld>
+</file>
+
+<file path=ppt/slides/slide13.xml><?xml version="1.0" encoding="utf-8"?>
+<p:sld xmlns:a="http://schemas.openxmlformats.org/drawingml/2006/main" xmlns:r="http://schemas.openxmlformats.org/officeDocument/2006/relationships" xmlns:p="http://schemas.openxmlformats.org/presentationml/2006/main">
+  <p:cSld>
+    <p:spTree>
+      <p:nvGrpSpPr>
+        <p:cNvPr id="1" name=""/>
+        <p:cNvGrpSpPr/>
+        <p:nvPr/>
+      </p:nvGrpSpPr>
+      <p:grpSpPr>
+        <a:xfrm>
+          <a:off x="0" y="0"/>
+          <a:ext cx="0" cy="0"/>
+          <a:chOff x="0" y="0"/>
+          <a:chExt cx="0" cy="0"/>
+        </a:xfrm>
+      </p:grpSpPr>
+      <p:sp>
+        <p:nvSpPr>
+          <p:cNvPr id="5" name="TextBox 4"/>
+          <p:cNvSpPr txBox="1"/>
+          <p:nvPr/>
+        </p:nvSpPr>
+        <p:spPr>
+          <a:xfrm>
+            <a:off x="0" y="0"/>
+            <a:ext cx="8134066" cy="523220"/>
+          </a:xfrm>
+          <a:prstGeom prst="rect">
+            <a:avLst/>
+          </a:prstGeom>
+        </p:spPr>
+        <p:txBody>
+          <a:bodyPr rtlCol="0">
+            <a:spAutoFit/>
+          </a:bodyPr>
+          <a:lstStyle/>
+          <a:p>
+            <a:r>
+              <a:rPr lang="en-US" sz="2800" dirty="0">
+                <a:solidFill>
+                  <a:srgbClr val="002060"/>
+                </a:solidFill>
+              </a:rPr>
+              <a:t>Lab #3 highlights</a:t>
+            </a:r>
+          </a:p>
+        </p:txBody>
+      </p:sp>
+      <p:sp>
+        <p:nvSpPr>
+          <p:cNvPr id="12" name="TextBox 11">
+            <a:extLst>
+              <a:ext uri="{FF2B5EF4-FFF2-40B4-BE49-F238E27FC236}">
+                <a16:creationId xmlns:a16="http://schemas.microsoft.com/office/drawing/2014/main" id="{F9342B84-0341-49AB-8F28-450046854806}"/>
+              </a:ext>
+            </a:extLst>
+          </p:cNvPr>
+          <p:cNvSpPr txBox="1"/>
+          <p:nvPr/>
+        </p:nvSpPr>
+        <p:spPr>
+          <a:xfrm>
+            <a:off x="118715" y="523220"/>
+            <a:ext cx="8634760" cy="5909310"/>
+          </a:xfrm>
+          <a:prstGeom prst="rect">
+            <a:avLst/>
+          </a:prstGeom>
+          <a:noFill/>
+        </p:spPr>
+        <p:txBody>
+          <a:bodyPr wrap="square" rtlCol="0">
+            <a:spAutoFit/>
+          </a:bodyPr>
+          <a:lstStyle/>
+          <a:p>
+            <a:r>
+              <a:rPr lang="en-US" sz="2200" u="sng" dirty="0"/>
+              <a:t>Next section</a:t>
+            </a:r>
+            <a:r>
+              <a:rPr lang="en-US" sz="2200" dirty="0"/>
+              <a:t>: Moving the dot around</a:t>
+            </a:r>
+          </a:p>
+          <a:p>
+            <a:endParaRPr lang="en-US" sz="2200" dirty="0"/>
+          </a:p>
+          <a:p>
+            <a:pPr marL="457200" indent="-457200">
+              <a:buFont typeface="+mj-lt"/>
+              <a:buAutoNum type="arabicPeriod"/>
+            </a:pPr>
+            <a:r>
+              <a:rPr lang="en-US" sz="2200" dirty="0"/>
+              <a:t>Create the </a:t>
+            </a:r>
+            <a:r>
+              <a:rPr lang="en-US" sz="2200" dirty="0" err="1">
+                <a:latin typeface="Consolas" panose="020B0609020204030204" pitchFamily="49" charset="0"/>
+                <a:cs typeface="Consolas" panose="020B0609020204030204" pitchFamily="49" charset="0"/>
+              </a:rPr>
+              <a:t>check_input</a:t>
+            </a:r>
+            <a:r>
+              <a:rPr lang="en-US" sz="2200" dirty="0">
+                <a:latin typeface="Consolas" panose="020B0609020204030204" pitchFamily="49" charset="0"/>
+                <a:cs typeface="Consolas" panose="020B0609020204030204" pitchFamily="49" charset="0"/>
+              </a:rPr>
+              <a:t> </a:t>
+            </a:r>
+            <a:r>
+              <a:rPr lang="en-US" sz="2200" dirty="0"/>
+              <a:t>function.</a:t>
+            </a:r>
+          </a:p>
+          <a:p>
+            <a:pPr marL="914400" lvl="1" indent="-457200">
+              <a:buFont typeface="Arial" panose="020B0604020202020204" pitchFamily="34" charset="0"/>
+              <a:buChar char="•"/>
+            </a:pPr>
+            <a:r>
+              <a:rPr lang="en-US" sz="2000" dirty="0"/>
+              <a:t>It will use the </a:t>
+            </a:r>
+            <a:r>
+              <a:rPr lang="en-US" sz="2000" dirty="0" err="1">
+                <a:latin typeface="Consolas" panose="020B0609020204030204" pitchFamily="49" charset="0"/>
+                <a:cs typeface="Consolas" panose="020B0609020204030204" pitchFamily="49" charset="0"/>
+              </a:rPr>
+              <a:t>input_get_keys</a:t>
+            </a:r>
+            <a:r>
+              <a:rPr lang="en-US" sz="2000" dirty="0">
+                <a:latin typeface="Consolas" panose="020B0609020204030204" pitchFamily="49" charset="0"/>
+                <a:cs typeface="Consolas" panose="020B0609020204030204" pitchFamily="49" charset="0"/>
+              </a:rPr>
+              <a:t> </a:t>
+            </a:r>
+            <a:r>
+              <a:rPr lang="en-US" sz="2000" dirty="0"/>
+              <a:t>function from led_keypad.asm to retrieve the identity of the key that the user is pushing down.</a:t>
+            </a:r>
+          </a:p>
+          <a:p>
+            <a:pPr marL="457200" indent="-457200">
+              <a:buFont typeface="+mj-lt"/>
+              <a:buAutoNum type="arabicPeriod"/>
+            </a:pPr>
+            <a:endParaRPr lang="en-US" sz="2200" dirty="0"/>
+          </a:p>
+          <a:p>
+            <a:pPr marL="457200" indent="-457200">
+              <a:buFont typeface="+mj-lt"/>
+              <a:buAutoNum type="arabicPeriod"/>
+            </a:pPr>
+            <a:r>
+              <a:rPr lang="en-US" sz="2200" dirty="0"/>
+              <a:t>Use the returned keypress information to direct the dot</a:t>
+            </a:r>
+          </a:p>
+          <a:p>
+            <a:pPr marL="914400" lvl="1" indent="-457200">
+              <a:buFont typeface="Arial" panose="020B0604020202020204" pitchFamily="34" charset="0"/>
+              <a:buChar char="•"/>
+            </a:pPr>
+            <a:r>
+              <a:rPr lang="en-US" sz="2000" dirty="0"/>
+              <a:t>This will involve manipulating the value of either </a:t>
+            </a:r>
+            <a:r>
+              <a:rPr lang="en-US" sz="2000" dirty="0" err="1"/>
+              <a:t>dot_x</a:t>
+            </a:r>
+            <a:r>
+              <a:rPr lang="en-US" sz="2000" dirty="0"/>
+              <a:t> or </a:t>
+            </a:r>
+            <a:r>
+              <a:rPr lang="en-US" sz="2000" dirty="0" err="1"/>
+              <a:t>dot_y</a:t>
+            </a:r>
+            <a:endParaRPr lang="en-US" sz="2000" dirty="0"/>
+          </a:p>
+          <a:p>
+            <a:pPr marL="914400" lvl="1" indent="-457200">
+              <a:buFont typeface="Arial" panose="020B0604020202020204" pitchFamily="34" charset="0"/>
+              <a:buChar char="•"/>
+            </a:pPr>
+            <a:r>
+              <a:rPr lang="en-US" sz="2000" dirty="0"/>
+              <a:t>Since the manipulations of </a:t>
+            </a:r>
+            <a:r>
+              <a:rPr lang="en-US" sz="2000" dirty="0" err="1"/>
+              <a:t>dot_x</a:t>
+            </a:r>
+            <a:r>
+              <a:rPr lang="en-US" sz="2000" dirty="0"/>
+              <a:t>/</a:t>
+            </a:r>
+            <a:r>
+              <a:rPr lang="en-US" sz="2000" dirty="0" err="1"/>
+              <a:t>dot_y</a:t>
+            </a:r>
+            <a:r>
+              <a:rPr lang="en-US" sz="2000" dirty="0"/>
+              <a:t> depend on the keypress, you can expect a lot of conditional instructions and labels</a:t>
+            </a:r>
+          </a:p>
+          <a:p>
+            <a:pPr marL="914400" lvl="1" indent="-457200">
+              <a:buFont typeface="Arial" panose="020B0604020202020204" pitchFamily="34" charset="0"/>
+              <a:buChar char="•"/>
+            </a:pPr>
+            <a:r>
+              <a:rPr lang="en-US" sz="2000" dirty="0"/>
+              <a:t>Remember, to change a variable’s value: </a:t>
+            </a:r>
+          </a:p>
+          <a:p>
+            <a:pPr marL="1371600" lvl="2" indent="-457200">
+              <a:buFont typeface="Arial" panose="020B0604020202020204" pitchFamily="34" charset="0"/>
+              <a:buChar char="•"/>
+            </a:pPr>
+            <a:r>
+              <a:rPr lang="en-US" sz="2000" dirty="0"/>
+              <a:t>Load it into a register (</a:t>
+            </a:r>
+            <a:r>
+              <a:rPr lang="en-US" sz="2000" dirty="0" err="1"/>
+              <a:t>lw</a:t>
+            </a:r>
+            <a:r>
+              <a:rPr lang="en-US" sz="2000" dirty="0"/>
+              <a:t> &lt;register&gt;, &lt;</a:t>
+            </a:r>
+            <a:r>
+              <a:rPr lang="en-US" sz="2000" dirty="0" err="1"/>
+              <a:t>variable_name</a:t>
+            </a:r>
+            <a:r>
+              <a:rPr lang="en-US" sz="2000" dirty="0"/>
+              <a:t>&gt;)</a:t>
+            </a:r>
+          </a:p>
+          <a:p>
+            <a:pPr marL="1371600" lvl="2" indent="-457200">
+              <a:buFont typeface="Arial" panose="020B0604020202020204" pitchFamily="34" charset="0"/>
+              <a:buChar char="•"/>
+            </a:pPr>
+            <a:r>
+              <a:rPr lang="en-US" sz="2000" dirty="0"/>
+              <a:t>Change the value in the register</a:t>
+            </a:r>
+          </a:p>
+          <a:p>
+            <a:pPr marL="1371600" lvl="2" indent="-457200">
+              <a:buFont typeface="Arial" panose="020B0604020202020204" pitchFamily="34" charset="0"/>
+              <a:buChar char="•"/>
+            </a:pPr>
+            <a:r>
+              <a:rPr lang="en-US" sz="2000" dirty="0"/>
+              <a:t>Store that new value (</a:t>
+            </a:r>
+            <a:r>
+              <a:rPr lang="en-US" sz="2000" dirty="0" err="1"/>
+              <a:t>sw</a:t>
+            </a:r>
+            <a:r>
+              <a:rPr lang="en-US" sz="2000" dirty="0"/>
+              <a:t> &lt;register&gt;, &lt;</a:t>
+            </a:r>
+            <a:r>
+              <a:rPr lang="en-US" sz="2000" dirty="0" err="1"/>
+              <a:t>variable_name</a:t>
+            </a:r>
+            <a:r>
+              <a:rPr lang="en-US" sz="2000" dirty="0"/>
+              <a:t>&gt;)</a:t>
+            </a:r>
+          </a:p>
+          <a:p>
+            <a:pPr marL="1371600" lvl="2" indent="-457200">
+              <a:buFont typeface="Arial" panose="020B0604020202020204" pitchFamily="34" charset="0"/>
+              <a:buChar char="•"/>
+            </a:pPr>
+            <a:endParaRPr lang="en-US" sz="2200" dirty="0"/>
+          </a:p>
+          <a:p>
+            <a:pPr marL="457200" indent="-457200">
+              <a:buFont typeface="+mj-lt"/>
+              <a:buAutoNum type="arabicPeriod"/>
+            </a:pPr>
+            <a:endParaRPr lang="en-US" sz="2200" dirty="0"/>
+          </a:p>
+          <a:p>
+            <a:pPr marL="914400" lvl="1" indent="-457200">
+              <a:buFont typeface="Arial" panose="020B0604020202020204" pitchFamily="34" charset="0"/>
+              <a:buChar char="•"/>
+            </a:pPr>
+            <a:endParaRPr lang="en-US" sz="2200" dirty="0"/>
+          </a:p>
+          <a:p>
+            <a:r>
+              <a:rPr lang="en-US" sz="2200" dirty="0"/>
+              <a:t> </a:t>
+            </a:r>
+            <a:endParaRPr lang="en-US" sz="2200" u="sng" dirty="0"/>
+          </a:p>
+        </p:txBody>
+      </p:sp>
+    </p:spTree>
+    <p:extLst>
+      <p:ext uri="{BB962C8B-B14F-4D97-AF65-F5344CB8AC3E}">
+        <p14:creationId xmlns:p14="http://schemas.microsoft.com/office/powerpoint/2010/main" val="1109263921"/>
+      </p:ext>
+    </p:extLst>
+  </p:cSld>
+  <p:clrMapOvr>
+    <a:masterClrMapping/>
+  </p:clrMapOvr>
+</p:sld>
+</file>
+
+<file path=ppt/slides/slide14.xml><?xml version="1.0" encoding="utf-8"?>
+<p:sld xmlns:a="http://schemas.openxmlformats.org/drawingml/2006/main" xmlns:r="http://schemas.openxmlformats.org/officeDocument/2006/relationships" xmlns:p="http://schemas.openxmlformats.org/presentationml/2006/main">
+  <p:cSld>
+    <p:spTree>
+      <p:nvGrpSpPr>
+        <p:cNvPr id="1" name=""/>
+        <p:cNvGrpSpPr/>
+        <p:nvPr/>
+      </p:nvGrpSpPr>
+      <p:grpSpPr>
+        <a:xfrm>
+          <a:off x="0" y="0"/>
+          <a:ext cx="0" cy="0"/>
+          <a:chOff x="0" y="0"/>
+          <a:chExt cx="0" cy="0"/>
+        </a:xfrm>
+      </p:grpSpPr>
+      <p:sp>
+        <p:nvSpPr>
+          <p:cNvPr id="5" name="TextBox 4"/>
+          <p:cNvSpPr txBox="1"/>
+          <p:nvPr/>
+        </p:nvSpPr>
+        <p:spPr>
+          <a:xfrm>
+            <a:off x="0" y="0"/>
+            <a:ext cx="8134066" cy="523220"/>
+          </a:xfrm>
+          <a:prstGeom prst="rect">
+            <a:avLst/>
+          </a:prstGeom>
+        </p:spPr>
+        <p:txBody>
+          <a:bodyPr rtlCol="0">
+            <a:spAutoFit/>
+          </a:bodyPr>
+          <a:lstStyle/>
+          <a:p>
+            <a:r>
+              <a:rPr lang="en-US" sz="2800" dirty="0">
+                <a:solidFill>
+                  <a:srgbClr val="002060"/>
+                </a:solidFill>
+              </a:rPr>
+              <a:t>Lab #3 highlights</a:t>
+            </a:r>
+          </a:p>
+        </p:txBody>
+      </p:sp>
+      <p:sp>
+        <p:nvSpPr>
+          <p:cNvPr id="12" name="TextBox 11">
+            <a:extLst>
+              <a:ext uri="{FF2B5EF4-FFF2-40B4-BE49-F238E27FC236}">
+                <a16:creationId xmlns:a16="http://schemas.microsoft.com/office/drawing/2014/main" id="{F9342B84-0341-49AB-8F28-450046854806}"/>
+              </a:ext>
+            </a:extLst>
+          </p:cNvPr>
+          <p:cNvSpPr txBox="1"/>
+          <p:nvPr/>
+        </p:nvSpPr>
+        <p:spPr>
+          <a:xfrm>
+            <a:off x="118715" y="523220"/>
+            <a:ext cx="8634760" cy="2462213"/>
+          </a:xfrm>
+          <a:prstGeom prst="rect">
+            <a:avLst/>
+          </a:prstGeom>
+          <a:noFill/>
+        </p:spPr>
+        <p:txBody>
+          <a:bodyPr wrap="square" rtlCol="0">
+            <a:spAutoFit/>
+          </a:bodyPr>
+          <a:lstStyle/>
+          <a:p>
+            <a:r>
+              <a:rPr lang="en-US" sz="2200" u="sng" dirty="0"/>
+              <a:t>Next section</a:t>
+            </a:r>
+            <a:r>
+              <a:rPr lang="en-US" sz="2200" dirty="0"/>
+              <a:t>: Moving the dot around</a:t>
+            </a:r>
+          </a:p>
+          <a:p>
+            <a:endParaRPr lang="en-US" sz="2200" dirty="0"/>
+          </a:p>
+          <a:p>
+            <a:r>
+              <a:rPr lang="en-US" sz="2200" dirty="0"/>
+              <a:t>Once your dot-moving code is done, you can test it out.  (Just see the note in the instructions about clicking the display first).</a:t>
+            </a:r>
+          </a:p>
+          <a:p>
+            <a:pPr marL="457200" indent="-457200">
+              <a:buFont typeface="+mj-lt"/>
+              <a:buAutoNum type="arabicParenR"/>
+            </a:pPr>
+            <a:endParaRPr lang="en-US" sz="2200" dirty="0"/>
+          </a:p>
+          <a:p>
+            <a:pPr marL="914400" lvl="1" indent="-457200">
+              <a:buFont typeface="Arial" panose="020B0604020202020204" pitchFamily="34" charset="0"/>
+              <a:buChar char="•"/>
+            </a:pPr>
+            <a:endParaRPr lang="en-US" sz="2200" dirty="0"/>
+          </a:p>
+          <a:p>
+            <a:r>
+              <a:rPr lang="en-US" sz="2200" dirty="0"/>
+              <a:t> </a:t>
+            </a:r>
+            <a:endParaRPr lang="en-US" sz="2200" u="sng" dirty="0"/>
+          </a:p>
+        </p:txBody>
+      </p:sp>
+    </p:spTree>
+    <p:extLst>
+      <p:ext uri="{BB962C8B-B14F-4D97-AF65-F5344CB8AC3E}">
+        <p14:creationId xmlns:p14="http://schemas.microsoft.com/office/powerpoint/2010/main" val="2207524201"/>
+      </p:ext>
+    </p:extLst>
+  </p:cSld>
+  <p:clrMapOvr>
+    <a:masterClrMapping/>
+  </p:clrMapOvr>
+</p:sld>
+</file>
+
+<file path=ppt/slides/slide15.xml><?xml version="1.0" encoding="utf-8"?>
+<p:sld xmlns:a="http://schemas.openxmlformats.org/drawingml/2006/main" xmlns:r="http://schemas.openxmlformats.org/officeDocument/2006/relationships" xmlns:p="http://schemas.openxmlformats.org/presentationml/2006/main">
+  <p:cSld>
+    <p:spTree>
+      <p:nvGrpSpPr>
+        <p:cNvPr id="1" name=""/>
+        <p:cNvGrpSpPr/>
+        <p:nvPr/>
+      </p:nvGrpSpPr>
+      <p:grpSpPr>
+        <a:xfrm>
+          <a:off x="0" y="0"/>
+          <a:ext cx="0" cy="0"/>
+          <a:chOff x="0" y="0"/>
+          <a:chExt cx="0" cy="0"/>
+        </a:xfrm>
+      </p:grpSpPr>
+      <p:sp>
+        <p:nvSpPr>
+          <p:cNvPr id="5" name="TextBox 4"/>
+          <p:cNvSpPr txBox="1"/>
+          <p:nvPr/>
+        </p:nvSpPr>
+        <p:spPr>
+          <a:xfrm>
+            <a:off x="0" y="0"/>
+            <a:ext cx="8134066" cy="523220"/>
+          </a:xfrm>
+          <a:prstGeom prst="rect">
+            <a:avLst/>
+          </a:prstGeom>
+        </p:spPr>
+        <p:txBody>
+          <a:bodyPr rtlCol="0">
+            <a:spAutoFit/>
+          </a:bodyPr>
+          <a:lstStyle/>
+          <a:p>
+            <a:r>
+              <a:rPr lang="en-US" sz="2800" dirty="0">
+                <a:solidFill>
+                  <a:srgbClr val="002060"/>
+                </a:solidFill>
+              </a:rPr>
+              <a:t>Lab #3 highlights</a:t>
+            </a:r>
+          </a:p>
+        </p:txBody>
+      </p:sp>
+      <p:sp>
+        <p:nvSpPr>
+          <p:cNvPr id="12" name="TextBox 11">
+            <a:extLst>
+              <a:ext uri="{FF2B5EF4-FFF2-40B4-BE49-F238E27FC236}">
+                <a16:creationId xmlns:a16="http://schemas.microsoft.com/office/drawing/2014/main" id="{F9342B84-0341-49AB-8F28-450046854806}"/>
+              </a:ext>
+            </a:extLst>
+          </p:cNvPr>
+          <p:cNvSpPr txBox="1"/>
+          <p:nvPr/>
+        </p:nvSpPr>
+        <p:spPr>
+          <a:xfrm>
+            <a:off x="118715" y="523220"/>
+            <a:ext cx="8634760" cy="1785104"/>
+          </a:xfrm>
+          <a:prstGeom prst="rect">
+            <a:avLst/>
+          </a:prstGeom>
+          <a:noFill/>
+        </p:spPr>
+        <p:txBody>
+          <a:bodyPr wrap="square" rtlCol="0">
+            <a:spAutoFit/>
+          </a:bodyPr>
+          <a:lstStyle/>
+          <a:p>
+            <a:r>
+              <a:rPr lang="en-US" sz="2200" u="sng" dirty="0"/>
+              <a:t>Final section</a:t>
+            </a:r>
+            <a:r>
+              <a:rPr lang="en-US" sz="2200" dirty="0"/>
+              <a:t>: Allowing dot movement to “wrap around” the screen</a:t>
+            </a:r>
+          </a:p>
+          <a:p>
+            <a:endParaRPr lang="en-US" sz="2200" dirty="0"/>
+          </a:p>
+          <a:p>
+            <a:pPr marL="342900" indent="-342900">
+              <a:buFont typeface="Arial" panose="020B0604020202020204" pitchFamily="34" charset="0"/>
+              <a:buChar char="•"/>
+            </a:pPr>
+            <a:r>
+              <a:rPr lang="en-US" sz="2200" dirty="0"/>
+              <a:t>You are asked to add the equivalent of the following lines to the end of your check input function:  </a:t>
+            </a:r>
+          </a:p>
+          <a:p>
+            <a:endParaRPr lang="en-US" sz="2200" dirty="0"/>
+          </a:p>
+        </p:txBody>
+      </p:sp>
+      <p:pic>
+        <p:nvPicPr>
+          <p:cNvPr id="3" name="Picture 2" descr="cs0447_2184_lab3.md · GitHub - Mozilla Firefox">
+            <a:extLst>
+              <a:ext uri="{FF2B5EF4-FFF2-40B4-BE49-F238E27FC236}">
+                <a16:creationId xmlns:a16="http://schemas.microsoft.com/office/drawing/2014/main" id="{4B1568B5-F860-46F6-85F8-48938BA79924}"/>
+              </a:ext>
+            </a:extLst>
+          </p:cNvPr>
+          <p:cNvPicPr>
+            <a:picLocks noChangeAspect="1"/>
+          </p:cNvPicPr>
+          <p:nvPr/>
+        </p:nvPicPr>
+        <p:blipFill rotWithShape="1">
+          <a:blip r:embed="rId3">
+            <a:extLst>
+              <a:ext uri="{28A0092B-C50C-407E-A947-70E740481C1C}">
+                <a14:useLocalDpi xmlns:a14="http://schemas.microsoft.com/office/drawing/2010/main" val="0"/>
+              </a:ext>
+            </a:extLst>
+          </a:blip>
+          <a:srcRect l="21622" t="46137" r="64597" b="45552"/>
+          <a:stretch/>
+        </p:blipFill>
+        <p:spPr>
+          <a:xfrm>
+            <a:off x="502920" y="2183904"/>
+            <a:ext cx="4389120" cy="1435049"/>
+          </a:xfrm>
+          <a:prstGeom prst="rect">
+            <a:avLst/>
+          </a:prstGeom>
+        </p:spPr>
+      </p:pic>
+      <p:sp>
+        <p:nvSpPr>
+          <p:cNvPr id="6" name="TextBox 5">
+            <a:extLst>
+              <a:ext uri="{FF2B5EF4-FFF2-40B4-BE49-F238E27FC236}">
+                <a16:creationId xmlns:a16="http://schemas.microsoft.com/office/drawing/2014/main" id="{D33A419D-F1D6-4525-8142-A110BF8D928E}"/>
+              </a:ext>
+            </a:extLst>
+          </p:cNvPr>
+          <p:cNvSpPr txBox="1"/>
+          <p:nvPr/>
+        </p:nvSpPr>
+        <p:spPr>
+          <a:xfrm>
+            <a:off x="254620" y="3851307"/>
+            <a:ext cx="8634760" cy="769441"/>
+          </a:xfrm>
+          <a:prstGeom prst="rect">
+            <a:avLst/>
+          </a:prstGeom>
+          <a:noFill/>
+        </p:spPr>
+        <p:txBody>
+          <a:bodyPr wrap="square" rtlCol="0">
+            <a:spAutoFit/>
+          </a:bodyPr>
+          <a:lstStyle/>
+          <a:p>
+            <a:r>
+              <a:rPr lang="en-US" sz="2200" dirty="0"/>
+              <a:t>In these steps, you’ll be applying “and” masks.  The next few slides explain what this entails, and why it’s done.</a:t>
+            </a:r>
+          </a:p>
+        </p:txBody>
+      </p:sp>
+    </p:spTree>
+    <p:extLst>
+      <p:ext uri="{BB962C8B-B14F-4D97-AF65-F5344CB8AC3E}">
+        <p14:creationId xmlns:p14="http://schemas.microsoft.com/office/powerpoint/2010/main" val="2837003436"/>
+      </p:ext>
+    </p:extLst>
+  </p:cSld>
+  <p:clrMapOvr>
+    <a:masterClrMapping/>
+  </p:clrMapOvr>
+</p:sld>
+</file>
+
+<file path=ppt/slides/slide16.xml><?xml version="1.0" encoding="utf-8"?>
+<p:sld xmlns:a="http://schemas.openxmlformats.org/drawingml/2006/main" xmlns:r="http://schemas.openxmlformats.org/officeDocument/2006/relationships" xmlns:p="http://schemas.openxmlformats.org/presentationml/2006/main">
+  <p:cSld>
+    <p:spTree>
+      <p:nvGrpSpPr>
+        <p:cNvPr id="1" name=""/>
+        <p:cNvGrpSpPr/>
+        <p:nvPr/>
+      </p:nvGrpSpPr>
+      <p:grpSpPr>
+        <a:xfrm>
+          <a:off x="0" y="0"/>
+          <a:ext cx="0" cy="0"/>
+          <a:chOff x="0" y="0"/>
+          <a:chExt cx="0" cy="0"/>
+        </a:xfrm>
+      </p:grpSpPr>
+      <p:sp>
+        <p:nvSpPr>
+          <p:cNvPr id="5" name="TextBox 4"/>
+          <p:cNvSpPr txBox="1"/>
+          <p:nvPr/>
+        </p:nvSpPr>
+        <p:spPr>
+          <a:xfrm>
+            <a:off x="0" y="0"/>
+            <a:ext cx="8134066" cy="523220"/>
+          </a:xfrm>
+          <a:prstGeom prst="rect">
+            <a:avLst/>
+          </a:prstGeom>
+        </p:spPr>
+        <p:txBody>
+          <a:bodyPr rtlCol="0">
+            <a:spAutoFit/>
+          </a:bodyPr>
+          <a:lstStyle/>
+          <a:p>
+            <a:r>
+              <a:rPr lang="en-US" sz="2800" dirty="0">
+                <a:solidFill>
+                  <a:srgbClr val="002060"/>
+                </a:solidFill>
+              </a:rPr>
+              <a:t>Lab #3 highlights</a:t>
+            </a:r>
+          </a:p>
+        </p:txBody>
+      </p:sp>
+      <p:pic>
+        <p:nvPicPr>
+          <p:cNvPr id="3" name="Picture 2" descr="cs0447_2184_lab3.md · GitHub - Mozilla Firefox">
+            <a:extLst>
+              <a:ext uri="{FF2B5EF4-FFF2-40B4-BE49-F238E27FC236}">
+                <a16:creationId xmlns:a16="http://schemas.microsoft.com/office/drawing/2014/main" id="{4B1568B5-F860-46F6-85F8-48938BA79924}"/>
+              </a:ext>
+            </a:extLst>
+          </p:cNvPr>
+          <p:cNvPicPr>
+            <a:picLocks noChangeAspect="1"/>
+          </p:cNvPicPr>
+          <p:nvPr/>
+        </p:nvPicPr>
+        <p:blipFill rotWithShape="1">
+          <a:blip r:embed="rId3">
+            <a:extLst>
+              <a:ext uri="{28A0092B-C50C-407E-A947-70E740481C1C}">
+                <a14:useLocalDpi xmlns:a14="http://schemas.microsoft.com/office/drawing/2010/main" val="0"/>
+              </a:ext>
+            </a:extLst>
+          </a:blip>
+          <a:srcRect l="21622" t="46137" r="64597" b="45552"/>
+          <a:stretch/>
+        </p:blipFill>
+        <p:spPr>
+          <a:xfrm>
+            <a:off x="182880" y="754259"/>
+            <a:ext cx="4389120" cy="1435049"/>
+          </a:xfrm>
+          <a:prstGeom prst="rect">
+            <a:avLst/>
+          </a:prstGeom>
+        </p:spPr>
+      </p:pic>
+      <p:sp>
+        <p:nvSpPr>
+          <p:cNvPr id="6" name="TextBox 5">
+            <a:extLst>
+              <a:ext uri="{FF2B5EF4-FFF2-40B4-BE49-F238E27FC236}">
+                <a16:creationId xmlns:a16="http://schemas.microsoft.com/office/drawing/2014/main" id="{D33A419D-F1D6-4525-8142-A110BF8D928E}"/>
+              </a:ext>
+            </a:extLst>
+          </p:cNvPr>
+          <p:cNvSpPr txBox="1"/>
+          <p:nvPr/>
+        </p:nvSpPr>
+        <p:spPr>
+          <a:xfrm>
+            <a:off x="254620" y="2420347"/>
+            <a:ext cx="8634760" cy="3139321"/>
+          </a:xfrm>
+          <a:prstGeom prst="rect">
+            <a:avLst/>
+          </a:prstGeom>
+          <a:noFill/>
+        </p:spPr>
+        <p:txBody>
+          <a:bodyPr wrap="square" rtlCol="0">
+            <a:spAutoFit/>
+          </a:bodyPr>
+          <a:lstStyle/>
+          <a:p>
+            <a:pPr marL="342900" indent="-342900">
+              <a:buFont typeface="Arial" panose="020B0604020202020204" pitchFamily="34" charset="0"/>
+              <a:buChar char="•"/>
+            </a:pPr>
+            <a:r>
+              <a:rPr lang="en-US" sz="2200" dirty="0"/>
+              <a:t>The problem: </a:t>
+            </a:r>
+          </a:p>
+          <a:p>
+            <a:pPr marL="800100" lvl="1" indent="-342900">
+              <a:buFont typeface="Arial" panose="020B0604020202020204" pitchFamily="34" charset="0"/>
+              <a:buChar char="•"/>
+            </a:pPr>
+            <a:r>
+              <a:rPr lang="en-US" sz="2200" dirty="0"/>
+              <a:t>The display grid is 64 x 64 (see top of led_keypad.asm)</a:t>
+            </a:r>
+          </a:p>
+          <a:p>
+            <a:pPr marL="800100" lvl="1" indent="-342900">
+              <a:buFont typeface="Arial" panose="020B0604020202020204" pitchFamily="34" charset="0"/>
+              <a:buChar char="•"/>
+            </a:pPr>
+            <a:r>
+              <a:rPr lang="en-US" sz="2200" dirty="0"/>
+              <a:t>If </a:t>
+            </a:r>
+            <a:r>
+              <a:rPr lang="en-US" sz="2200" dirty="0" err="1"/>
+              <a:t>dot_x</a:t>
+            </a:r>
+            <a:r>
+              <a:rPr lang="en-US" sz="2200" dirty="0"/>
+              <a:t> grows to &gt; 63, we essentially want to find </a:t>
+            </a:r>
+            <a:r>
+              <a:rPr lang="en-US" sz="2200" dirty="0" err="1"/>
+              <a:t>dot_x</a:t>
+            </a:r>
+            <a:r>
+              <a:rPr lang="en-US" sz="2200" dirty="0"/>
+              <a:t> % 63 to get the appropriate value for the wraparound effect (same applies to </a:t>
+            </a:r>
+            <a:r>
+              <a:rPr lang="en-US" sz="2200" dirty="0" err="1"/>
+              <a:t>dot_y</a:t>
+            </a:r>
+            <a:r>
+              <a:rPr lang="en-US" sz="2200" dirty="0"/>
+              <a:t>). </a:t>
+            </a:r>
+          </a:p>
+          <a:p>
+            <a:pPr marL="800100" lvl="1" indent="-342900">
+              <a:buFont typeface="Arial" panose="020B0604020202020204" pitchFamily="34" charset="0"/>
+              <a:buChar char="•"/>
+            </a:pPr>
+            <a:r>
+              <a:rPr lang="en-US" sz="2200" dirty="0"/>
+              <a:t>If </a:t>
+            </a:r>
+            <a:r>
+              <a:rPr lang="en-US" sz="2200" dirty="0" err="1"/>
+              <a:t>dot_x</a:t>
+            </a:r>
+            <a:r>
+              <a:rPr lang="en-US" sz="2200" dirty="0"/>
+              <a:t> or </a:t>
+            </a:r>
+            <a:r>
+              <a:rPr lang="en-US" sz="2200" dirty="0" err="1"/>
+              <a:t>dot_y</a:t>
+            </a:r>
+            <a:r>
+              <a:rPr lang="en-US" sz="2200" dirty="0"/>
+              <a:t> becomes negative, we want to reset it to a value equal to 64 + </a:t>
+            </a:r>
+            <a:r>
+              <a:rPr lang="en-US" sz="2200" dirty="0" err="1"/>
+              <a:t>dot_x</a:t>
+            </a:r>
+            <a:r>
+              <a:rPr lang="en-US" sz="2200" dirty="0"/>
+              <a:t> (or </a:t>
+            </a:r>
+            <a:r>
+              <a:rPr lang="en-US" sz="2200" dirty="0" err="1"/>
+              <a:t>dot_y</a:t>
+            </a:r>
+            <a:r>
+              <a:rPr lang="en-US" sz="2200" dirty="0"/>
+              <a:t>)</a:t>
+            </a:r>
+          </a:p>
+          <a:p>
+            <a:pPr marL="800100" lvl="1" indent="-342900">
+              <a:buFont typeface="Arial" panose="020B0604020202020204" pitchFamily="34" charset="0"/>
+              <a:buChar char="•"/>
+            </a:pPr>
+            <a:r>
+              <a:rPr lang="en-US" sz="2200" dirty="0"/>
+              <a:t>Bitwise AND with 63 will make both of these effects happen.</a:t>
+            </a:r>
+          </a:p>
+          <a:p>
+            <a:pPr marL="800100" lvl="1" indent="-342900">
+              <a:buFont typeface="Arial" panose="020B0604020202020204" pitchFamily="34" charset="0"/>
+              <a:buChar char="•"/>
+            </a:pPr>
+            <a:endParaRPr lang="en-US" sz="2200" dirty="0"/>
+          </a:p>
+        </p:txBody>
+      </p:sp>
+    </p:spTree>
+    <p:extLst>
+      <p:ext uri="{BB962C8B-B14F-4D97-AF65-F5344CB8AC3E}">
+        <p14:creationId xmlns:p14="http://schemas.microsoft.com/office/powerpoint/2010/main" val="1184044332"/>
+      </p:ext>
+    </p:extLst>
+  </p:cSld>
+  <p:clrMapOvr>
+    <a:masterClrMapping/>
+  </p:clrMapOvr>
+</p:sld>
+</file>
+
+<file path=ppt/slides/slide17.xml><?xml version="1.0" encoding="utf-8"?>
+<p:sld xmlns:a="http://schemas.openxmlformats.org/drawingml/2006/main" xmlns:r="http://schemas.openxmlformats.org/officeDocument/2006/relationships" xmlns:p="http://schemas.openxmlformats.org/presentationml/2006/main">
+  <p:cSld>
+    <p:spTree>
+      <p:nvGrpSpPr>
+        <p:cNvPr id="1" name=""/>
+        <p:cNvGrpSpPr/>
+        <p:nvPr/>
+      </p:nvGrpSpPr>
+      <p:grpSpPr>
+        <a:xfrm>
+          <a:off x="0" y="0"/>
+          <a:ext cx="0" cy="0"/>
+          <a:chOff x="0" y="0"/>
+          <a:chExt cx="0" cy="0"/>
+        </a:xfrm>
+      </p:grpSpPr>
+      <p:sp>
+        <p:nvSpPr>
+          <p:cNvPr id="5" name="TextBox 4"/>
+          <p:cNvSpPr txBox="1"/>
+          <p:nvPr/>
+        </p:nvSpPr>
+        <p:spPr>
+          <a:xfrm>
+            <a:off x="0" y="0"/>
+            <a:ext cx="8134066" cy="523220"/>
+          </a:xfrm>
+          <a:prstGeom prst="rect">
+            <a:avLst/>
+          </a:prstGeom>
+        </p:spPr>
+        <p:txBody>
+          <a:bodyPr rtlCol="0">
+            <a:spAutoFit/>
+          </a:bodyPr>
+          <a:lstStyle/>
+          <a:p>
+            <a:r>
+              <a:rPr lang="en-US" sz="2800" dirty="0">
+                <a:solidFill>
+                  <a:srgbClr val="002060"/>
+                </a:solidFill>
+              </a:rPr>
+              <a:t>Lab #3 highlights</a:t>
+            </a:r>
+          </a:p>
+        </p:txBody>
+      </p:sp>
+      <p:pic>
+        <p:nvPicPr>
+          <p:cNvPr id="3" name="Picture 2" descr="cs0447_2184_lab3.md · GitHub - Mozilla Firefox">
+            <a:extLst>
+              <a:ext uri="{FF2B5EF4-FFF2-40B4-BE49-F238E27FC236}">
+                <a16:creationId xmlns:a16="http://schemas.microsoft.com/office/drawing/2014/main" id="{4B1568B5-F860-46F6-85F8-48938BA79924}"/>
+              </a:ext>
+            </a:extLst>
+          </p:cNvPr>
+          <p:cNvPicPr>
+            <a:picLocks noChangeAspect="1"/>
+          </p:cNvPicPr>
+          <p:nvPr/>
+        </p:nvPicPr>
+        <p:blipFill rotWithShape="1">
+          <a:blip r:embed="rId3">
+            <a:extLst>
+              <a:ext uri="{28A0092B-C50C-407E-A947-70E740481C1C}">
+                <a14:useLocalDpi xmlns:a14="http://schemas.microsoft.com/office/drawing/2010/main" val="0"/>
+              </a:ext>
+            </a:extLst>
+          </a:blip>
+          <a:srcRect l="21622" t="46137" r="64597" b="45552"/>
+          <a:stretch/>
+        </p:blipFill>
+        <p:spPr>
+          <a:xfrm>
+            <a:off x="182880" y="754259"/>
+            <a:ext cx="4389120" cy="1435049"/>
+          </a:xfrm>
+          <a:prstGeom prst="rect">
+            <a:avLst/>
+          </a:prstGeom>
+        </p:spPr>
+      </p:pic>
+      <p:sp>
+        <p:nvSpPr>
+          <p:cNvPr id="6" name="TextBox 5">
+            <a:extLst>
+              <a:ext uri="{FF2B5EF4-FFF2-40B4-BE49-F238E27FC236}">
+                <a16:creationId xmlns:a16="http://schemas.microsoft.com/office/drawing/2014/main" id="{D33A419D-F1D6-4525-8142-A110BF8D928E}"/>
+              </a:ext>
+            </a:extLst>
+          </p:cNvPr>
+          <p:cNvSpPr txBox="1"/>
+          <p:nvPr/>
+        </p:nvSpPr>
+        <p:spPr>
+          <a:xfrm>
+            <a:off x="254620" y="2420347"/>
+            <a:ext cx="8634760" cy="430887"/>
+          </a:xfrm>
+          <a:prstGeom prst="rect">
+            <a:avLst/>
+          </a:prstGeom>
+          <a:noFill/>
+        </p:spPr>
+        <p:txBody>
+          <a:bodyPr wrap="square" rtlCol="0">
+            <a:spAutoFit/>
+          </a:bodyPr>
+          <a:lstStyle/>
+          <a:p>
+            <a:pPr lvl="1"/>
+            <a:r>
+              <a:rPr lang="en-US" sz="2200" u="sng" dirty="0"/>
+              <a:t>Bitwise AND with 63 (example with </a:t>
+            </a:r>
+            <a:r>
+              <a:rPr lang="en-US" sz="2200" u="sng" dirty="0" err="1"/>
+              <a:t>dot_x</a:t>
+            </a:r>
+            <a:r>
+              <a:rPr lang="en-US" sz="2200" u="sng" dirty="0"/>
+              <a:t> value of -1)</a:t>
+            </a:r>
+            <a:r>
+              <a:rPr lang="en-US" sz="2200" dirty="0"/>
+              <a:t>: </a:t>
+            </a:r>
+          </a:p>
+        </p:txBody>
+      </p:sp>
+      <p:sp>
+        <p:nvSpPr>
+          <p:cNvPr id="7" name="TextBox 6">
+            <a:extLst>
+              <a:ext uri="{FF2B5EF4-FFF2-40B4-BE49-F238E27FC236}">
+                <a16:creationId xmlns:a16="http://schemas.microsoft.com/office/drawing/2014/main" id="{5A35E067-ECEF-4F30-A64E-960C24726233}"/>
+              </a:ext>
+            </a:extLst>
+          </p:cNvPr>
+          <p:cNvSpPr txBox="1"/>
+          <p:nvPr/>
+        </p:nvSpPr>
+        <p:spPr>
+          <a:xfrm>
+            <a:off x="229906" y="2998113"/>
+            <a:ext cx="8778170" cy="2123658"/>
+          </a:xfrm>
+          <a:prstGeom prst="rect">
+            <a:avLst/>
+          </a:prstGeom>
+          <a:noFill/>
+        </p:spPr>
+        <p:txBody>
+          <a:bodyPr wrap="square" rtlCol="0">
+            <a:spAutoFit/>
+          </a:bodyPr>
+          <a:lstStyle/>
+          <a:p>
+            <a:pPr lvl="1"/>
+            <a:r>
+              <a:rPr lang="en-US" sz="2200" dirty="0">
+                <a:latin typeface="Consolas" panose="020B0609020204030204" pitchFamily="49" charset="0"/>
+                <a:cs typeface="Consolas" panose="020B0609020204030204" pitchFamily="49" charset="0"/>
+              </a:rPr>
+              <a:t>  11111111 </a:t>
+            </a:r>
+            <a:r>
+              <a:rPr lang="en-US" sz="2200" dirty="0">
+                <a:solidFill>
+                  <a:srgbClr val="00B050"/>
+                </a:solidFill>
+                <a:latin typeface="Consolas" panose="020B0609020204030204" pitchFamily="49" charset="0"/>
+                <a:cs typeface="Consolas" panose="020B0609020204030204" pitchFamily="49" charset="0"/>
+              </a:rPr>
+              <a:t># -1 in binary two’s complement</a:t>
+            </a:r>
+          </a:p>
+          <a:p>
+            <a:pPr lvl="1"/>
+            <a:r>
+              <a:rPr lang="en-US" sz="2200" dirty="0">
+                <a:latin typeface="Consolas" panose="020B0609020204030204" pitchFamily="49" charset="0"/>
+                <a:cs typeface="Consolas" panose="020B0609020204030204" pitchFamily="49" charset="0"/>
+              </a:rPr>
+              <a:t>&amp; 00111111 </a:t>
+            </a:r>
+            <a:r>
+              <a:rPr lang="en-US" sz="2200" dirty="0">
+                <a:solidFill>
+                  <a:srgbClr val="00B050"/>
+                </a:solidFill>
+                <a:latin typeface="Consolas" panose="020B0609020204030204" pitchFamily="49" charset="0"/>
+                <a:cs typeface="Consolas" panose="020B0609020204030204" pitchFamily="49" charset="0"/>
+              </a:rPr>
+              <a:t># 63</a:t>
+            </a:r>
+            <a:endParaRPr lang="en-US" sz="2200" dirty="0">
+              <a:latin typeface="Consolas" panose="020B0609020204030204" pitchFamily="49" charset="0"/>
+              <a:cs typeface="Consolas" panose="020B0609020204030204" pitchFamily="49" charset="0"/>
+            </a:endParaRPr>
+          </a:p>
+          <a:p>
+            <a:pPr lvl="1"/>
+            <a:r>
+              <a:rPr lang="en-US" sz="2200" dirty="0">
+                <a:latin typeface="Consolas" panose="020B0609020204030204" pitchFamily="49" charset="0"/>
+                <a:cs typeface="Consolas" panose="020B0609020204030204" pitchFamily="49" charset="0"/>
+              </a:rPr>
+              <a:t> ---------</a:t>
+            </a:r>
+          </a:p>
+          <a:p>
+            <a:pPr lvl="1"/>
+            <a:r>
+              <a:rPr lang="en-US" sz="2200" dirty="0">
+                <a:latin typeface="Consolas" panose="020B0609020204030204" pitchFamily="49" charset="0"/>
+                <a:cs typeface="Consolas" panose="020B0609020204030204" pitchFamily="49" charset="0"/>
+              </a:rPr>
+              <a:t>  00111111 </a:t>
+            </a:r>
+            <a:r>
+              <a:rPr lang="en-US" sz="2200" dirty="0">
+                <a:solidFill>
+                  <a:srgbClr val="00B050"/>
+                </a:solidFill>
+                <a:latin typeface="Consolas" panose="020B0609020204030204" pitchFamily="49" charset="0"/>
+                <a:cs typeface="Consolas" panose="020B0609020204030204" pitchFamily="49" charset="0"/>
+              </a:rPr>
+              <a:t># 63 = 64 - 1</a:t>
+            </a:r>
+          </a:p>
+          <a:p>
+            <a:pPr lvl="1"/>
+            <a:endParaRPr lang="en-US" sz="2200" dirty="0">
+              <a:solidFill>
+                <a:srgbClr val="00B050"/>
+              </a:solidFill>
+              <a:latin typeface="Consolas" panose="020B0609020204030204" pitchFamily="49" charset="0"/>
+              <a:cs typeface="Consolas" panose="020B0609020204030204" pitchFamily="49" charset="0"/>
+            </a:endParaRPr>
+          </a:p>
+          <a:p>
+            <a:pPr lvl="1"/>
+            <a:r>
+              <a:rPr lang="en-US" sz="2200" dirty="0">
+                <a:solidFill>
+                  <a:srgbClr val="00B050"/>
+                </a:solidFill>
+                <a:latin typeface="Consolas" panose="020B0609020204030204" pitchFamily="49" charset="0"/>
+                <a:cs typeface="Consolas" panose="020B0609020204030204" pitchFamily="49" charset="0"/>
+              </a:rPr>
+              <a:t># AND only outputs 1 when both input bits = 1</a:t>
+            </a:r>
+            <a:endParaRPr lang="en-US" sz="2200" dirty="0">
+              <a:latin typeface="Consolas" panose="020B0609020204030204" pitchFamily="49" charset="0"/>
+              <a:cs typeface="Consolas" panose="020B0609020204030204" pitchFamily="49" charset="0"/>
+            </a:endParaRPr>
+          </a:p>
+        </p:txBody>
+      </p:sp>
+    </p:spTree>
+    <p:extLst>
+      <p:ext uri="{BB962C8B-B14F-4D97-AF65-F5344CB8AC3E}">
+        <p14:creationId xmlns:p14="http://schemas.microsoft.com/office/powerpoint/2010/main" val="3279688575"/>
+      </p:ext>
+    </p:extLst>
+  </p:cSld>
+  <p:clrMapOvr>
+    <a:masterClrMapping/>
+  </p:clrMapOvr>
+</p:sld>
+</file>
+
+<file path=ppt/slides/slide18.xml><?xml version="1.0" encoding="utf-8"?>
+<p:sld xmlns:a="http://schemas.openxmlformats.org/drawingml/2006/main" xmlns:r="http://schemas.openxmlformats.org/officeDocument/2006/relationships" xmlns:p="http://schemas.openxmlformats.org/presentationml/2006/main">
+  <p:cSld>
+    <p:spTree>
+      <p:nvGrpSpPr>
+        <p:cNvPr id="1" name=""/>
+        <p:cNvGrpSpPr/>
+        <p:nvPr/>
+      </p:nvGrpSpPr>
+      <p:grpSpPr>
+        <a:xfrm>
+          <a:off x="0" y="0"/>
+          <a:ext cx="0" cy="0"/>
+          <a:chOff x="0" y="0"/>
+          <a:chExt cx="0" cy="0"/>
+        </a:xfrm>
+      </p:grpSpPr>
+      <p:sp>
+        <p:nvSpPr>
+          <p:cNvPr id="5" name="TextBox 4"/>
+          <p:cNvSpPr txBox="1"/>
+          <p:nvPr/>
+        </p:nvSpPr>
+        <p:spPr>
+          <a:xfrm>
+            <a:off x="0" y="0"/>
+            <a:ext cx="8134066" cy="523220"/>
+          </a:xfrm>
+          <a:prstGeom prst="rect">
+            <a:avLst/>
+          </a:prstGeom>
+        </p:spPr>
+        <p:txBody>
+          <a:bodyPr rtlCol="0">
+            <a:spAutoFit/>
+          </a:bodyPr>
+          <a:lstStyle/>
+          <a:p>
+            <a:r>
+              <a:rPr lang="en-US" sz="2800" dirty="0">
+                <a:solidFill>
+                  <a:srgbClr val="002060"/>
+                </a:solidFill>
+              </a:rPr>
+              <a:t>Lab #3 highlights</a:t>
+            </a:r>
+          </a:p>
+        </p:txBody>
+      </p:sp>
+      <p:pic>
+        <p:nvPicPr>
+          <p:cNvPr id="3" name="Picture 2" descr="cs0447_2184_lab3.md · GitHub - Mozilla Firefox">
+            <a:extLst>
+              <a:ext uri="{FF2B5EF4-FFF2-40B4-BE49-F238E27FC236}">
+                <a16:creationId xmlns:a16="http://schemas.microsoft.com/office/drawing/2014/main" id="{4B1568B5-F860-46F6-85F8-48938BA79924}"/>
+              </a:ext>
+            </a:extLst>
+          </p:cNvPr>
+          <p:cNvPicPr>
+            <a:picLocks noChangeAspect="1"/>
+          </p:cNvPicPr>
+          <p:nvPr/>
+        </p:nvPicPr>
+        <p:blipFill rotWithShape="1">
+          <a:blip r:embed="rId3">
+            <a:extLst>
+              <a:ext uri="{28A0092B-C50C-407E-A947-70E740481C1C}">
+                <a14:useLocalDpi xmlns:a14="http://schemas.microsoft.com/office/drawing/2010/main" val="0"/>
+              </a:ext>
+            </a:extLst>
+          </a:blip>
+          <a:srcRect l="21622" t="46137" r="64597" b="45552"/>
+          <a:stretch/>
+        </p:blipFill>
+        <p:spPr>
+          <a:xfrm>
+            <a:off x="182880" y="754259"/>
+            <a:ext cx="4389120" cy="1435049"/>
+          </a:xfrm>
+          <a:prstGeom prst="rect">
+            <a:avLst/>
+          </a:prstGeom>
+        </p:spPr>
+      </p:pic>
+      <p:sp>
+        <p:nvSpPr>
+          <p:cNvPr id="6" name="TextBox 5">
+            <a:extLst>
+              <a:ext uri="{FF2B5EF4-FFF2-40B4-BE49-F238E27FC236}">
+                <a16:creationId xmlns:a16="http://schemas.microsoft.com/office/drawing/2014/main" id="{D33A419D-F1D6-4525-8142-A110BF8D928E}"/>
+              </a:ext>
+            </a:extLst>
+          </p:cNvPr>
+          <p:cNvSpPr txBox="1"/>
+          <p:nvPr/>
+        </p:nvSpPr>
+        <p:spPr>
+          <a:xfrm>
+            <a:off x="254620" y="2420347"/>
+            <a:ext cx="8634760" cy="3477875"/>
+          </a:xfrm>
+          <a:prstGeom prst="rect">
+            <a:avLst/>
+          </a:prstGeom>
+          <a:noFill/>
+        </p:spPr>
+        <p:txBody>
+          <a:bodyPr wrap="square" rtlCol="0">
+            <a:spAutoFit/>
+          </a:bodyPr>
+          <a:lstStyle/>
+          <a:p>
+            <a:pPr lvl="1"/>
+            <a:r>
+              <a:rPr lang="en-US" sz="2200" u="sng" dirty="0"/>
+              <a:t>Bitwise AND in MIPS (see also MARS help)</a:t>
+            </a:r>
+            <a:r>
+              <a:rPr lang="en-US" sz="2200" dirty="0"/>
+              <a:t>: </a:t>
+            </a:r>
+          </a:p>
+          <a:p>
+            <a:pPr lvl="1"/>
+            <a:endParaRPr lang="en-US" sz="2200" dirty="0"/>
+          </a:p>
+          <a:p>
+            <a:pPr lvl="1"/>
+            <a:r>
+              <a:rPr lang="en-US" sz="2200" dirty="0"/>
+              <a:t>For inputs in t0 and t1, output in t2:</a:t>
+            </a:r>
+          </a:p>
+          <a:p>
+            <a:pPr lvl="1"/>
+            <a:r>
+              <a:rPr lang="en-US" sz="2200" dirty="0">
+                <a:latin typeface="Consolas" panose="020B0609020204030204" pitchFamily="49" charset="0"/>
+                <a:cs typeface="Consolas" panose="020B0609020204030204" pitchFamily="49" charset="0"/>
+              </a:rPr>
+              <a:t>and t2, t0, t1</a:t>
+            </a:r>
+          </a:p>
+          <a:p>
+            <a:pPr lvl="1"/>
+            <a:endParaRPr lang="en-US" sz="2200" dirty="0">
+              <a:latin typeface="Consolas" panose="020B0609020204030204" pitchFamily="49" charset="0"/>
+              <a:cs typeface="Consolas" panose="020B0609020204030204" pitchFamily="49" charset="0"/>
+            </a:endParaRPr>
+          </a:p>
+          <a:p>
+            <a:pPr lvl="1"/>
+            <a:r>
+              <a:rPr lang="en-US" sz="2200" dirty="0"/>
+              <a:t>For an input immediate value 63 and an input in t0, output in t1:</a:t>
+            </a:r>
+          </a:p>
+          <a:p>
+            <a:pPr lvl="1"/>
+            <a:r>
+              <a:rPr lang="en-US" sz="2200" dirty="0" err="1">
+                <a:latin typeface="Consolas" panose="020B0609020204030204" pitchFamily="49" charset="0"/>
+                <a:cs typeface="Consolas" panose="020B0609020204030204" pitchFamily="49" charset="0"/>
+              </a:rPr>
+              <a:t>andi</a:t>
+            </a:r>
+            <a:r>
+              <a:rPr lang="en-US" sz="2200" dirty="0">
+                <a:latin typeface="Consolas" panose="020B0609020204030204" pitchFamily="49" charset="0"/>
+                <a:cs typeface="Consolas" panose="020B0609020204030204" pitchFamily="49" charset="0"/>
+              </a:rPr>
+              <a:t> t1, t0, 63</a:t>
+            </a:r>
+          </a:p>
+          <a:p>
+            <a:pPr lvl="1"/>
+            <a:endParaRPr lang="en-US" sz="2200" dirty="0"/>
+          </a:p>
+          <a:p>
+            <a:pPr lvl="1"/>
+            <a:endParaRPr lang="en-US" sz="2200" dirty="0">
+              <a:latin typeface="Consolas" panose="020B0609020204030204" pitchFamily="49" charset="0"/>
+              <a:cs typeface="Consolas" panose="020B0609020204030204" pitchFamily="49" charset="0"/>
+            </a:endParaRPr>
+          </a:p>
+          <a:p>
+            <a:pPr lvl="1"/>
+            <a:endParaRPr lang="en-US" sz="2200" dirty="0"/>
+          </a:p>
+        </p:txBody>
+      </p:sp>
+    </p:spTree>
+    <p:extLst>
+      <p:ext uri="{BB962C8B-B14F-4D97-AF65-F5344CB8AC3E}">
+        <p14:creationId xmlns:p14="http://schemas.microsoft.com/office/powerpoint/2010/main" val="3570134989"/>
       </p:ext>
     </p:extLst>
   </p:cSld>
@@ -8847,6 +11764,385 @@
 </p:sld>
 </file>
 
+<file path=ppt/slides/slide8.xml><?xml version="1.0" encoding="utf-8"?>
+<p:sld xmlns:a="http://schemas.openxmlformats.org/drawingml/2006/main" xmlns:r="http://schemas.openxmlformats.org/officeDocument/2006/relationships" xmlns:p="http://schemas.openxmlformats.org/presentationml/2006/main">
+  <p:cSld>
+    <p:spTree>
+      <p:nvGrpSpPr>
+        <p:cNvPr id="1" name=""/>
+        <p:cNvGrpSpPr/>
+        <p:nvPr/>
+      </p:nvGrpSpPr>
+      <p:grpSpPr>
+        <a:xfrm>
+          <a:off x="0" y="0"/>
+          <a:ext cx="0" cy="0"/>
+          <a:chOff x="0" y="0"/>
+          <a:chExt cx="0" cy="0"/>
+        </a:xfrm>
+      </p:grpSpPr>
+      <p:sp>
+        <p:nvSpPr>
+          <p:cNvPr id="5" name="TextBox 4"/>
+          <p:cNvSpPr txBox="1"/>
+          <p:nvPr/>
+        </p:nvSpPr>
+        <p:spPr>
+          <a:xfrm>
+            <a:off x="0" y="0"/>
+            <a:ext cx="8134066" cy="523220"/>
+          </a:xfrm>
+          <a:prstGeom prst="rect">
+            <a:avLst/>
+          </a:prstGeom>
+        </p:spPr>
+        <p:txBody>
+          <a:bodyPr rtlCol="0">
+            <a:spAutoFit/>
+          </a:bodyPr>
+          <a:lstStyle/>
+          <a:p>
+            <a:r>
+              <a:rPr lang="en-US" sz="2800" dirty="0">
+                <a:solidFill>
+                  <a:srgbClr val="002060"/>
+                </a:solidFill>
+              </a:rPr>
+              <a:t>Lab #3 highlights</a:t>
+            </a:r>
+          </a:p>
+        </p:txBody>
+      </p:sp>
+      <p:pic>
+        <p:nvPicPr>
+          <p:cNvPr id="3" name="Picture 2" descr="cs0447_2184_lab3.md · GitHub - Mozilla Firefox">
+            <a:extLst>
+              <a:ext uri="{FF2B5EF4-FFF2-40B4-BE49-F238E27FC236}">
+                <a16:creationId xmlns:a16="http://schemas.microsoft.com/office/drawing/2014/main" id="{745C38B1-AD94-43A6-B0C7-561D5BB0EA44}"/>
+              </a:ext>
+            </a:extLst>
+          </p:cNvPr>
+          <p:cNvPicPr>
+            <a:picLocks noChangeAspect="1"/>
+          </p:cNvPicPr>
+          <p:nvPr/>
+        </p:nvPicPr>
+        <p:blipFill rotWithShape="1">
+          <a:blip r:embed="rId3">
+            <a:extLst>
+              <a:ext uri="{28A0092B-C50C-407E-A947-70E740481C1C}">
+                <a14:useLocalDpi xmlns:a14="http://schemas.microsoft.com/office/drawing/2010/main" val="0"/>
+              </a:ext>
+            </a:extLst>
+          </a:blip>
+          <a:srcRect l="19324" t="11484" r="41892" b="14975"/>
+          <a:stretch/>
+        </p:blipFill>
+        <p:spPr>
+          <a:xfrm>
+            <a:off x="1820150" y="750316"/>
+            <a:ext cx="5212080" cy="5357367"/>
+          </a:xfrm>
+          <a:prstGeom prst="rect">
+            <a:avLst/>
+          </a:prstGeom>
+        </p:spPr>
+      </p:pic>
+    </p:spTree>
+    <p:extLst>
+      <p:ext uri="{BB962C8B-B14F-4D97-AF65-F5344CB8AC3E}">
+        <p14:creationId xmlns:p14="http://schemas.microsoft.com/office/powerpoint/2010/main" val="2436551664"/>
+      </p:ext>
+    </p:extLst>
+  </p:cSld>
+  <p:clrMapOvr>
+    <a:masterClrMapping/>
+  </p:clrMapOvr>
+</p:sld>
+</file>
+
+<file path=ppt/slides/slide9.xml><?xml version="1.0" encoding="utf-8"?>
+<p:sld xmlns:a="http://schemas.openxmlformats.org/drawingml/2006/main" xmlns:r="http://schemas.openxmlformats.org/officeDocument/2006/relationships" xmlns:p="http://schemas.openxmlformats.org/presentationml/2006/main">
+  <p:cSld>
+    <p:spTree>
+      <p:nvGrpSpPr>
+        <p:cNvPr id="1" name=""/>
+        <p:cNvGrpSpPr/>
+        <p:nvPr/>
+      </p:nvGrpSpPr>
+      <p:grpSpPr>
+        <a:xfrm>
+          <a:off x="0" y="0"/>
+          <a:ext cx="0" cy="0"/>
+          <a:chOff x="0" y="0"/>
+          <a:chExt cx="0" cy="0"/>
+        </a:xfrm>
+      </p:grpSpPr>
+      <p:sp>
+        <p:nvSpPr>
+          <p:cNvPr id="5" name="TextBox 4"/>
+          <p:cNvSpPr txBox="1"/>
+          <p:nvPr/>
+        </p:nvSpPr>
+        <p:spPr>
+          <a:xfrm>
+            <a:off x="0" y="0"/>
+            <a:ext cx="8134066" cy="523220"/>
+          </a:xfrm>
+          <a:prstGeom prst="rect">
+            <a:avLst/>
+          </a:prstGeom>
+        </p:spPr>
+        <p:txBody>
+          <a:bodyPr rtlCol="0">
+            <a:spAutoFit/>
+          </a:bodyPr>
+          <a:lstStyle/>
+          <a:p>
+            <a:r>
+              <a:rPr lang="en-US" sz="2800" dirty="0">
+                <a:solidFill>
+                  <a:srgbClr val="002060"/>
+                </a:solidFill>
+              </a:rPr>
+              <a:t>Lab #3 highlights</a:t>
+            </a:r>
+          </a:p>
+        </p:txBody>
+      </p:sp>
+      <p:sp>
+        <p:nvSpPr>
+          <p:cNvPr id="12" name="TextBox 11">
+            <a:extLst>
+              <a:ext uri="{FF2B5EF4-FFF2-40B4-BE49-F238E27FC236}">
+                <a16:creationId xmlns:a16="http://schemas.microsoft.com/office/drawing/2014/main" id="{F9342B84-0341-49AB-8F28-450046854806}"/>
+              </a:ext>
+            </a:extLst>
+          </p:cNvPr>
+          <p:cNvSpPr txBox="1"/>
+          <p:nvPr/>
+        </p:nvSpPr>
+        <p:spPr>
+          <a:xfrm>
+            <a:off x="118715" y="523220"/>
+            <a:ext cx="7777510" cy="430887"/>
+          </a:xfrm>
+          <a:prstGeom prst="rect">
+            <a:avLst/>
+          </a:prstGeom>
+          <a:noFill/>
+        </p:spPr>
+        <p:txBody>
+          <a:bodyPr wrap="square" rtlCol="0">
+            <a:spAutoFit/>
+          </a:bodyPr>
+          <a:lstStyle/>
+          <a:p>
+            <a:r>
+              <a:rPr lang="en-US" sz="2200" u="sng" dirty="0"/>
+              <a:t>Section 1</a:t>
+            </a:r>
+            <a:r>
+              <a:rPr lang="en-US" sz="2200" dirty="0"/>
+              <a:t>: Getting set up with the Keypad and LED simulator tool.</a:t>
+            </a:r>
+            <a:endParaRPr lang="en-US" sz="2200" u="sng" dirty="0"/>
+          </a:p>
+        </p:txBody>
+      </p:sp>
+      <p:sp>
+        <p:nvSpPr>
+          <p:cNvPr id="13" name="TextBox 12">
+            <a:extLst>
+              <a:ext uri="{FF2B5EF4-FFF2-40B4-BE49-F238E27FC236}">
+                <a16:creationId xmlns:a16="http://schemas.microsoft.com/office/drawing/2014/main" id="{F9342B84-0341-49AB-8F28-450046854806}"/>
+              </a:ext>
+            </a:extLst>
+          </p:cNvPr>
+          <p:cNvSpPr txBox="1"/>
+          <p:nvPr/>
+        </p:nvSpPr>
+        <p:spPr>
+          <a:xfrm>
+            <a:off x="566390" y="1166633"/>
+            <a:ext cx="7777510" cy="5170646"/>
+          </a:xfrm>
+          <a:prstGeom prst="rect">
+            <a:avLst/>
+          </a:prstGeom>
+          <a:noFill/>
+        </p:spPr>
+        <p:txBody>
+          <a:bodyPr wrap="square" rtlCol="0">
+            <a:spAutoFit/>
+          </a:bodyPr>
+          <a:lstStyle/>
+          <a:p>
+            <a:r>
+              <a:rPr lang="en-US" sz="2200" dirty="0"/>
+              <a:t>Instructions are provided; pay special attention to the following: </a:t>
+            </a:r>
+          </a:p>
+          <a:p>
+            <a:endParaRPr lang="en-US" sz="2200" dirty="0"/>
+          </a:p>
+          <a:p>
+            <a:pPr marL="342900" indent="-342900">
+              <a:buFont typeface="Arial" panose="020B0604020202020204" pitchFamily="34" charset="0"/>
+              <a:buChar char="•"/>
+            </a:pPr>
+            <a:r>
+              <a:rPr lang="en-US" sz="2200" dirty="0">
+                <a:solidFill>
+                  <a:srgbClr val="0070C0"/>
+                </a:solidFill>
+              </a:rPr>
+              <a:t>Be sure to type </a:t>
+            </a:r>
+            <a:r>
+              <a:rPr lang="en-US" sz="2000" dirty="0">
+                <a:solidFill>
+                  <a:srgbClr val="0070C0"/>
+                </a:solidFill>
+                <a:latin typeface="Consolas" panose="020B0609020204030204" pitchFamily="49" charset="0"/>
+                <a:cs typeface="Consolas" panose="020B0609020204030204" pitchFamily="49" charset="0"/>
+              </a:rPr>
+              <a:t>.include “led_keypad.asm” </a:t>
+            </a:r>
+            <a:r>
+              <a:rPr lang="en-US" sz="2200" dirty="0">
+                <a:solidFill>
+                  <a:srgbClr val="0070C0"/>
+                </a:solidFill>
+              </a:rPr>
+              <a:t>at the top of your file.</a:t>
+            </a:r>
+          </a:p>
+          <a:p>
+            <a:pPr marL="800100" lvl="1" indent="-342900">
+              <a:buFont typeface="Arial" panose="020B0604020202020204" pitchFamily="34" charset="0"/>
+              <a:buChar char="•"/>
+            </a:pPr>
+            <a:r>
+              <a:rPr lang="en-US" sz="2200" dirty="0">
+                <a:solidFill>
+                  <a:srgbClr val="0070C0"/>
+                </a:solidFill>
+              </a:rPr>
+              <a:t>Remember the quotes!</a:t>
+            </a:r>
+          </a:p>
+          <a:p>
+            <a:pPr marL="800100" lvl="1" indent="-342900">
+              <a:buFont typeface="Arial" panose="020B0604020202020204" pitchFamily="34" charset="0"/>
+              <a:buChar char="•"/>
+            </a:pPr>
+            <a:r>
+              <a:rPr lang="en-US" sz="2200" dirty="0">
+                <a:solidFill>
+                  <a:srgbClr val="0070C0"/>
+                </a:solidFill>
+              </a:rPr>
+              <a:t>Make sure the led_keypad.asm file is present in your working directory (it can be downloaded from the </a:t>
+            </a:r>
+            <a:r>
+              <a:rPr lang="en-US" sz="2200" dirty="0" err="1">
+                <a:solidFill>
+                  <a:srgbClr val="0070C0"/>
+                </a:solidFill>
+              </a:rPr>
+              <a:t>Github</a:t>
+            </a:r>
+            <a:r>
+              <a:rPr lang="en-US" sz="2200" dirty="0">
+                <a:solidFill>
+                  <a:srgbClr val="0070C0"/>
+                </a:solidFill>
+              </a:rPr>
+              <a:t> page with the instructions for the lab).</a:t>
+            </a:r>
+          </a:p>
+          <a:p>
+            <a:pPr marL="800100" lvl="1" indent="-342900">
+              <a:buFont typeface="Arial" panose="020B0604020202020204" pitchFamily="34" charset="0"/>
+              <a:buChar char="•"/>
+            </a:pPr>
+            <a:endParaRPr lang="en-US" sz="2200" dirty="0">
+              <a:solidFill>
+                <a:srgbClr val="0070C0"/>
+              </a:solidFill>
+            </a:endParaRPr>
+          </a:p>
+          <a:p>
+            <a:pPr marL="342900" indent="-342900">
+              <a:buFont typeface="Arial" panose="020B0604020202020204" pitchFamily="34" charset="0"/>
+              <a:buChar char="•"/>
+            </a:pPr>
+            <a:r>
+              <a:rPr lang="en-US" sz="2200" dirty="0">
+                <a:solidFill>
+                  <a:srgbClr val="002060"/>
+                </a:solidFill>
+              </a:rPr>
+              <a:t>The led_keypad.asm file contains several named constants and functions that will be useful for you.</a:t>
+            </a:r>
+          </a:p>
+          <a:p>
+            <a:pPr marL="800100" lvl="1" indent="-342900">
+              <a:buFont typeface="Arial" panose="020B0604020202020204" pitchFamily="34" charset="0"/>
+              <a:buChar char="•"/>
+            </a:pPr>
+            <a:r>
+              <a:rPr lang="en-US" sz="2200" dirty="0">
+                <a:solidFill>
+                  <a:srgbClr val="002060"/>
+                </a:solidFill>
+              </a:rPr>
+              <a:t>The .include directive (see MARS help) allows you to access those constants and functions without having to copy them into your own </a:t>
+            </a:r>
+            <a:r>
+              <a:rPr lang="en-US" sz="2200" dirty="0" err="1">
+                <a:solidFill>
+                  <a:srgbClr val="002060"/>
+                </a:solidFill>
+              </a:rPr>
+              <a:t>asm</a:t>
+            </a:r>
+            <a:r>
+              <a:rPr lang="en-US" sz="2200" dirty="0">
+                <a:solidFill>
+                  <a:srgbClr val="002060"/>
+                </a:solidFill>
+              </a:rPr>
+              <a:t> file.</a:t>
+            </a:r>
+          </a:p>
+          <a:p>
+            <a:pPr marL="800100" lvl="1" indent="-342900">
+              <a:buFont typeface="Arial" panose="020B0604020202020204" pitchFamily="34" charset="0"/>
+              <a:buChar char="•"/>
+            </a:pPr>
+            <a:endParaRPr lang="en-US" sz="2200" dirty="0">
+              <a:solidFill>
+                <a:srgbClr val="0070C0"/>
+              </a:solidFill>
+            </a:endParaRPr>
+          </a:p>
+        </p:txBody>
+      </p:sp>
+    </p:spTree>
+    <p:extLst>
+      <p:ext uri="{BB962C8B-B14F-4D97-AF65-F5344CB8AC3E}">
+        <p14:creationId xmlns:p14="http://schemas.microsoft.com/office/powerpoint/2010/main" val="2503125392"/>
+      </p:ext>
+    </p:extLst>
+  </p:cSld>
+  <p:clrMapOvr>
+    <a:masterClrMapping/>
+  </p:clrMapOvr>
+</p:sld>
+</file>
+
 <file path=ppt/theme/theme1.xml><?xml version="1.0" encoding="utf-8"?>
 <a:theme xmlns:a="http://schemas.openxmlformats.org/drawingml/2006/main" name="Office Theme">
   <a:themeElements>

</xml_diff>